<commit_message>
More methods lecture update
</commit_message>
<xml_diff>
--- a/slides/On-Campus/06_02_MoreMethods.pptx
+++ b/slides/On-Campus/06_02_MoreMethods.pptx
@@ -155,768 +155,75 @@
 <pc:chgInfo xmlns:a="http://schemas.openxmlformats.org/drawingml/2006/main" xmlns:r="http://schemas.openxmlformats.org/officeDocument/2006/relationships" xmlns:ac="http://schemas.microsoft.com/office/drawing/2013/main/command" xmlns:pc="http://schemas.microsoft.com/office/powerpoint/2013/main/command">
   <pc:docChgLst>
     <pc:chgData name="Marcia Moraes" userId="c9c67e8a-58e2-4733-9a1c-5d44fec4775b" providerId="ADAL" clId="{3495DFC1-9E0B-4456-8253-75922C6B6819}"/>
-    <pc:docChg chg="undo custSel addSld delSld modSld modMainMaster">
-      <pc:chgData name="Marcia Moraes" userId="c9c67e8a-58e2-4733-9a1c-5d44fec4775b" providerId="ADAL" clId="{3495DFC1-9E0B-4456-8253-75922C6B6819}" dt="2023-02-22T02:41:01.487" v="653" actId="1076"/>
+  </pc:docChgLst>
+  <pc:docChgLst>
+    <pc:chgData name="Marcia Moraes" userId="c9c67e8a-58e2-4733-9a1c-5d44fec4775b" providerId="ADAL" clId="{0251B3BA-5450-4D15-BEE8-7017FEF9B9ED}"/>
+    <pc:docChg chg="custSel modSld">
+      <pc:chgData name="Marcia Moraes" userId="c9c67e8a-58e2-4733-9a1c-5d44fec4775b" providerId="ADAL" clId="{0251B3BA-5450-4D15-BEE8-7017FEF9B9ED}" dt="2023-09-14T14:00:00.814" v="140" actId="1076"/>
       <pc:docMkLst>
         <pc:docMk/>
       </pc:docMkLst>
-      <pc:sldChg chg="modSp">
-        <pc:chgData name="Marcia Moraes" userId="c9c67e8a-58e2-4733-9a1c-5d44fec4775b" providerId="ADAL" clId="{3495DFC1-9E0B-4456-8253-75922C6B6819}" dt="2023-02-22T01:14:38.575" v="199" actId="20577"/>
-        <pc:sldMkLst>
-          <pc:docMk/>
-          <pc:sldMk cId="2729348737" sldId="257"/>
-        </pc:sldMkLst>
-        <pc:spChg chg="mod">
-          <ac:chgData name="Marcia Moraes" userId="c9c67e8a-58e2-4733-9a1c-5d44fec4775b" providerId="ADAL" clId="{3495DFC1-9E0B-4456-8253-75922C6B6819}" dt="2023-02-22T01:14:38.575" v="199" actId="20577"/>
-          <ac:spMkLst>
-            <pc:docMk/>
-            <pc:sldMk cId="2729348737" sldId="257"/>
-            <ac:spMk id="4" creationId="{D6148A1E-4BB9-3E41-9954-7E0FE5CDE376}"/>
-          </ac:spMkLst>
-        </pc:spChg>
-        <pc:spChg chg="mod">
-          <ac:chgData name="Marcia Moraes" userId="c9c67e8a-58e2-4733-9a1c-5d44fec4775b" providerId="ADAL" clId="{3495DFC1-9E0B-4456-8253-75922C6B6819}" dt="2023-02-22T01:02:46.665" v="51" actId="255"/>
-          <ac:spMkLst>
-            <pc:docMk/>
-            <pc:sldMk cId="2729348737" sldId="257"/>
-            <ac:spMk id="5" creationId="{60370ACD-6E3D-5D4E-8918-7EDF38D2E5B4}"/>
-          </ac:spMkLst>
-        </pc:spChg>
-        <pc:spChg chg="mod">
-          <ac:chgData name="Marcia Moraes" userId="c9c67e8a-58e2-4733-9a1c-5d44fec4775b" providerId="ADAL" clId="{3495DFC1-9E0B-4456-8253-75922C6B6819}" dt="2023-02-22T01:03:22.675" v="56" actId="1076"/>
-          <ac:spMkLst>
-            <pc:docMk/>
-            <pc:sldMk cId="2729348737" sldId="257"/>
-            <ac:spMk id="6" creationId="{5B0F3AC0-CAD8-D243-AE80-9528F11067ED}"/>
-          </ac:spMkLst>
-        </pc:spChg>
-        <pc:spChg chg="mod">
-          <ac:chgData name="Marcia Moraes" userId="c9c67e8a-58e2-4733-9a1c-5d44fec4775b" providerId="ADAL" clId="{3495DFC1-9E0B-4456-8253-75922C6B6819}" dt="2023-02-22T01:03:07.095" v="54" actId="255"/>
-          <ac:spMkLst>
-            <pc:docMk/>
-            <pc:sldMk cId="2729348737" sldId="257"/>
-            <ac:spMk id="7" creationId="{AEC06065-364B-654F-8CBE-449502045610}"/>
-          </ac:spMkLst>
-        </pc:spChg>
-      </pc:sldChg>
-      <pc:sldChg chg="addSp delSp modSp delAnim">
-        <pc:chgData name="Marcia Moraes" userId="c9c67e8a-58e2-4733-9a1c-5d44fec4775b" providerId="ADAL" clId="{3495DFC1-9E0B-4456-8253-75922C6B6819}" dt="2023-02-22T01:11:54.669" v="68" actId="478"/>
-        <pc:sldMkLst>
-          <pc:docMk/>
-          <pc:sldMk cId="1959879594" sldId="258"/>
-        </pc:sldMkLst>
-        <pc:spChg chg="del mod">
-          <ac:chgData name="Marcia Moraes" userId="c9c67e8a-58e2-4733-9a1c-5d44fec4775b" providerId="ADAL" clId="{3495DFC1-9E0B-4456-8253-75922C6B6819}" dt="2023-02-22T01:11:31.788" v="64" actId="478"/>
-          <ac:spMkLst>
-            <pc:docMk/>
-            <pc:sldMk cId="1959879594" sldId="258"/>
-            <ac:spMk id="3" creationId="{1DC58C9F-5CBD-034F-9A6A-2105E76A162F}"/>
-          </ac:spMkLst>
-        </pc:spChg>
-        <pc:spChg chg="del">
-          <ac:chgData name="Marcia Moraes" userId="c9c67e8a-58e2-4733-9a1c-5d44fec4775b" providerId="ADAL" clId="{3495DFC1-9E0B-4456-8253-75922C6B6819}" dt="2023-02-22T01:11:29.652" v="63" actId="478"/>
-          <ac:spMkLst>
-            <pc:docMk/>
-            <pc:sldMk cId="1959879594" sldId="258"/>
-            <ac:spMk id="5" creationId="{5EC5E1D6-40E7-CE46-89AF-C4B5A220E742}"/>
-          </ac:spMkLst>
-        </pc:spChg>
-        <pc:spChg chg="add del mod">
-          <ac:chgData name="Marcia Moraes" userId="c9c67e8a-58e2-4733-9a1c-5d44fec4775b" providerId="ADAL" clId="{3495DFC1-9E0B-4456-8253-75922C6B6819}" dt="2023-02-22T01:11:54.669" v="68" actId="478"/>
-          <ac:spMkLst>
-            <pc:docMk/>
-            <pc:sldMk cId="1959879594" sldId="258"/>
-            <ac:spMk id="6" creationId="{6E0F1B68-04E2-40FC-94B7-B6625F2EB61F}"/>
-          </ac:spMkLst>
-        </pc:spChg>
-        <pc:spChg chg="del">
-          <ac:chgData name="Marcia Moraes" userId="c9c67e8a-58e2-4733-9a1c-5d44fec4775b" providerId="ADAL" clId="{3495DFC1-9E0B-4456-8253-75922C6B6819}" dt="2023-02-22T01:11:29.652" v="63" actId="478"/>
-          <ac:spMkLst>
-            <pc:docMk/>
-            <pc:sldMk cId="1959879594" sldId="258"/>
-            <ac:spMk id="8" creationId="{44A507A9-B1AE-3846-8CDF-8BDEDC131F9C}"/>
-          </ac:spMkLst>
-        </pc:spChg>
-        <pc:spChg chg="del">
-          <ac:chgData name="Marcia Moraes" userId="c9c67e8a-58e2-4733-9a1c-5d44fec4775b" providerId="ADAL" clId="{3495DFC1-9E0B-4456-8253-75922C6B6819}" dt="2023-02-22T01:11:29.652" v="63" actId="478"/>
-          <ac:spMkLst>
-            <pc:docMk/>
-            <pc:sldMk cId="1959879594" sldId="258"/>
-            <ac:spMk id="10" creationId="{B0432A09-841C-F442-A8F6-D5457488C9F9}"/>
-          </ac:spMkLst>
-        </pc:spChg>
-        <pc:spChg chg="del">
-          <ac:chgData name="Marcia Moraes" userId="c9c67e8a-58e2-4733-9a1c-5d44fec4775b" providerId="ADAL" clId="{3495DFC1-9E0B-4456-8253-75922C6B6819}" dt="2023-02-22T01:11:29.652" v="63" actId="478"/>
-          <ac:spMkLst>
-            <pc:docMk/>
-            <pc:sldMk cId="1959879594" sldId="258"/>
-            <ac:spMk id="11" creationId="{7E2698F8-C96D-484B-9B7A-BB3CC974BCC2}"/>
-          </ac:spMkLst>
-        </pc:spChg>
-        <pc:spChg chg="del">
-          <ac:chgData name="Marcia Moraes" userId="c9c67e8a-58e2-4733-9a1c-5d44fec4775b" providerId="ADAL" clId="{3495DFC1-9E0B-4456-8253-75922C6B6819}" dt="2023-02-22T01:11:29.652" v="63" actId="478"/>
-          <ac:spMkLst>
-            <pc:docMk/>
-            <pc:sldMk cId="1959879594" sldId="258"/>
-            <ac:spMk id="15" creationId="{50B82A2A-57A7-B446-BF62-3FEDF34014DA}"/>
-          </ac:spMkLst>
-        </pc:spChg>
-        <pc:spChg chg="del">
-          <ac:chgData name="Marcia Moraes" userId="c9c67e8a-58e2-4733-9a1c-5d44fec4775b" providerId="ADAL" clId="{3495DFC1-9E0B-4456-8253-75922C6B6819}" dt="2023-02-22T01:11:29.652" v="63" actId="478"/>
-          <ac:spMkLst>
-            <pc:docMk/>
-            <pc:sldMk cId="1959879594" sldId="258"/>
-            <ac:spMk id="18" creationId="{25EB3B28-039F-DD45-B27D-DFA3541ECCB0}"/>
-          </ac:spMkLst>
-        </pc:spChg>
-        <pc:spChg chg="del">
-          <ac:chgData name="Marcia Moraes" userId="c9c67e8a-58e2-4733-9a1c-5d44fec4775b" providerId="ADAL" clId="{3495DFC1-9E0B-4456-8253-75922C6B6819}" dt="2023-02-22T01:11:29.652" v="63" actId="478"/>
-          <ac:spMkLst>
-            <pc:docMk/>
-            <pc:sldMk cId="1959879594" sldId="258"/>
-            <ac:spMk id="26" creationId="{23B5807A-4B36-4842-AA66-7359FADD27B3}"/>
-          </ac:spMkLst>
-        </pc:spChg>
-        <pc:picChg chg="add mod">
-          <ac:chgData name="Marcia Moraes" userId="c9c67e8a-58e2-4733-9a1c-5d44fec4775b" providerId="ADAL" clId="{3495DFC1-9E0B-4456-8253-75922C6B6819}" dt="2023-02-22T01:11:51.387" v="67" actId="1076"/>
-          <ac:picMkLst>
-            <pc:docMk/>
-            <pc:sldMk cId="1959879594" sldId="258"/>
-            <ac:picMk id="9" creationId="{84E9C97A-A67A-4241-B1B6-FCD974EC4FFE}"/>
-          </ac:picMkLst>
-        </pc:picChg>
-        <pc:picChg chg="del mod">
-          <ac:chgData name="Marcia Moraes" userId="c9c67e8a-58e2-4733-9a1c-5d44fec4775b" providerId="ADAL" clId="{3495DFC1-9E0B-4456-8253-75922C6B6819}" dt="2023-02-22T01:11:23.671" v="62" actId="478"/>
-          <ac:picMkLst>
-            <pc:docMk/>
-            <pc:sldMk cId="1959879594" sldId="258"/>
-            <ac:picMk id="1026" creationId="{11608DC2-2D8B-4D4C-B6E8-C8208B0BB58D}"/>
-          </ac:picMkLst>
-        </pc:picChg>
-        <pc:picChg chg="del mod">
-          <ac:chgData name="Marcia Moraes" userId="c9c67e8a-58e2-4733-9a1c-5d44fec4775b" providerId="ADAL" clId="{3495DFC1-9E0B-4456-8253-75922C6B6819}" dt="2023-02-22T01:11:31.788" v="64" actId="478"/>
-          <ac:picMkLst>
-            <pc:docMk/>
-            <pc:sldMk cId="1959879594" sldId="258"/>
-            <ac:picMk id="1027" creationId="{D0A970B9-31DD-4348-A8C1-3B838C34CAA6}"/>
-          </ac:picMkLst>
-        </pc:picChg>
-        <pc:cxnChg chg="del mod">
-          <ac:chgData name="Marcia Moraes" userId="c9c67e8a-58e2-4733-9a1c-5d44fec4775b" providerId="ADAL" clId="{3495DFC1-9E0B-4456-8253-75922C6B6819}" dt="2023-02-22T01:11:29.652" v="63" actId="478"/>
-          <ac:cxnSpMkLst>
-            <pc:docMk/>
-            <pc:sldMk cId="1959879594" sldId="258"/>
-            <ac:cxnSpMk id="7" creationId="{BF12D9D8-08D2-7642-91EB-6127376F97BA}"/>
-          </ac:cxnSpMkLst>
-        </pc:cxnChg>
-        <pc:cxnChg chg="del mod">
-          <ac:chgData name="Marcia Moraes" userId="c9c67e8a-58e2-4733-9a1c-5d44fec4775b" providerId="ADAL" clId="{3495DFC1-9E0B-4456-8253-75922C6B6819}" dt="2023-02-22T01:11:29.652" v="63" actId="478"/>
-          <ac:cxnSpMkLst>
-            <pc:docMk/>
-            <pc:sldMk cId="1959879594" sldId="258"/>
-            <ac:cxnSpMk id="13" creationId="{8F67C512-F019-404C-AFE1-4D54D6B1E65D}"/>
-          </ac:cxnSpMkLst>
-        </pc:cxnChg>
-        <pc:cxnChg chg="del mod">
-          <ac:chgData name="Marcia Moraes" userId="c9c67e8a-58e2-4733-9a1c-5d44fec4775b" providerId="ADAL" clId="{3495DFC1-9E0B-4456-8253-75922C6B6819}" dt="2023-02-22T01:11:29.652" v="63" actId="478"/>
-          <ac:cxnSpMkLst>
-            <pc:docMk/>
-            <pc:sldMk cId="1959879594" sldId="258"/>
-            <ac:cxnSpMk id="17" creationId="{4317D5F9-1B9C-5E47-8F0C-010653DD7A5A}"/>
-          </ac:cxnSpMkLst>
-        </pc:cxnChg>
-        <pc:cxnChg chg="del mod">
-          <ac:chgData name="Marcia Moraes" userId="c9c67e8a-58e2-4733-9a1c-5d44fec4775b" providerId="ADAL" clId="{3495DFC1-9E0B-4456-8253-75922C6B6819}" dt="2023-02-22T01:11:29.652" v="63" actId="478"/>
-          <ac:cxnSpMkLst>
-            <pc:docMk/>
-            <pc:sldMk cId="1959879594" sldId="258"/>
-            <ac:cxnSpMk id="20" creationId="{59A779D5-1BEE-A547-9666-FE9382D420CA}"/>
-          </ac:cxnSpMkLst>
-        </pc:cxnChg>
-      </pc:sldChg>
-      <pc:sldChg chg="addSp delSp modSp">
-        <pc:chgData name="Marcia Moraes" userId="c9c67e8a-58e2-4733-9a1c-5d44fec4775b" providerId="ADAL" clId="{3495DFC1-9E0B-4456-8253-75922C6B6819}" dt="2023-02-22T02:36:48.445" v="468" actId="14100"/>
-        <pc:sldMkLst>
-          <pc:docMk/>
-          <pc:sldMk cId="2882182165" sldId="259"/>
-        </pc:sldMkLst>
-        <pc:spChg chg="mod">
-          <ac:chgData name="Marcia Moraes" userId="c9c67e8a-58e2-4733-9a1c-5d44fec4775b" providerId="ADAL" clId="{3495DFC1-9E0B-4456-8253-75922C6B6819}" dt="2023-02-22T02:28:03.757" v="431" actId="20577"/>
-          <ac:spMkLst>
-            <pc:docMk/>
-            <pc:sldMk cId="2882182165" sldId="259"/>
-            <ac:spMk id="2" creationId="{C7F79D63-5A78-5B4C-824B-A2A28B12E514}"/>
-          </ac:spMkLst>
-        </pc:spChg>
-        <pc:spChg chg="del">
-          <ac:chgData name="Marcia Moraes" userId="c9c67e8a-58e2-4733-9a1c-5d44fec4775b" providerId="ADAL" clId="{3495DFC1-9E0B-4456-8253-75922C6B6819}" dt="2023-02-22T02:28:06.340" v="432" actId="478"/>
-          <ac:spMkLst>
-            <pc:docMk/>
-            <pc:sldMk cId="2882182165" sldId="259"/>
-            <ac:spMk id="3" creationId="{21D516C4-EEC7-674B-91BF-04CF2A28920E}"/>
-          </ac:spMkLst>
-        </pc:spChg>
-        <pc:spChg chg="add del mod">
-          <ac:chgData name="Marcia Moraes" userId="c9c67e8a-58e2-4733-9a1c-5d44fec4775b" providerId="ADAL" clId="{3495DFC1-9E0B-4456-8253-75922C6B6819}" dt="2023-02-22T02:33:31.149" v="433" actId="478"/>
-          <ac:spMkLst>
-            <pc:docMk/>
-            <pc:sldMk cId="2882182165" sldId="259"/>
-            <ac:spMk id="5" creationId="{16BE65F6-5775-4E1C-A952-174648F5E30A}"/>
-          </ac:spMkLst>
-        </pc:spChg>
-        <pc:spChg chg="add mod">
-          <ac:chgData name="Marcia Moraes" userId="c9c67e8a-58e2-4733-9a1c-5d44fec4775b" providerId="ADAL" clId="{3495DFC1-9E0B-4456-8253-75922C6B6819}" dt="2023-02-22T02:34:31.837" v="447" actId="14100"/>
-          <ac:spMkLst>
-            <pc:docMk/>
-            <pc:sldMk cId="2882182165" sldId="259"/>
-            <ac:spMk id="6" creationId="{346AF321-782C-4F5B-B9BC-857DA2D94F8E}"/>
-          </ac:spMkLst>
-        </pc:spChg>
-        <pc:spChg chg="add mod">
-          <ac:chgData name="Marcia Moraes" userId="c9c67e8a-58e2-4733-9a1c-5d44fec4775b" providerId="ADAL" clId="{3495DFC1-9E0B-4456-8253-75922C6B6819}" dt="2023-02-22T02:36:44.461" v="467" actId="1076"/>
-          <ac:spMkLst>
-            <pc:docMk/>
-            <pc:sldMk cId="2882182165" sldId="259"/>
-            <ac:spMk id="7" creationId="{3728EE78-D4BC-4F43-9BDB-AAB279F702E0}"/>
-          </ac:spMkLst>
-        </pc:spChg>
-        <pc:cxnChg chg="add del mod">
-          <ac:chgData name="Marcia Moraes" userId="c9c67e8a-58e2-4733-9a1c-5d44fec4775b" providerId="ADAL" clId="{3495DFC1-9E0B-4456-8253-75922C6B6819}" dt="2023-02-22T02:35:35.173" v="453" actId="478"/>
-          <ac:cxnSpMkLst>
-            <pc:docMk/>
-            <pc:sldMk cId="2882182165" sldId="259"/>
-            <ac:cxnSpMk id="9" creationId="{A3F04D14-9726-48C7-89D8-A3FDF2AB8434}"/>
-          </ac:cxnSpMkLst>
-        </pc:cxnChg>
-        <pc:cxnChg chg="add mod">
-          <ac:chgData name="Marcia Moraes" userId="c9c67e8a-58e2-4733-9a1c-5d44fec4775b" providerId="ADAL" clId="{3495DFC1-9E0B-4456-8253-75922C6B6819}" dt="2023-02-22T02:36:48.445" v="468" actId="14100"/>
-          <ac:cxnSpMkLst>
-            <pc:docMk/>
-            <pc:sldMk cId="2882182165" sldId="259"/>
-            <ac:cxnSpMk id="12" creationId="{E13AF0E5-6E40-4DAF-8921-B0695F350ADA}"/>
-          </ac:cxnSpMkLst>
-        </pc:cxnChg>
-        <pc:cxnChg chg="add mod">
-          <ac:chgData name="Marcia Moraes" userId="c9c67e8a-58e2-4733-9a1c-5d44fec4775b" providerId="ADAL" clId="{3495DFC1-9E0B-4456-8253-75922C6B6819}" dt="2023-02-22T02:36:37.734" v="465" actId="1076"/>
-          <ac:cxnSpMkLst>
-            <pc:docMk/>
-            <pc:sldMk cId="2882182165" sldId="259"/>
-            <ac:cxnSpMk id="14" creationId="{B701EFE0-F742-4EA1-B9AB-2D0DC8F66A38}"/>
-          </ac:cxnSpMkLst>
-        </pc:cxnChg>
-        <pc:cxnChg chg="add mod">
-          <ac:chgData name="Marcia Moraes" userId="c9c67e8a-58e2-4733-9a1c-5d44fec4775b" providerId="ADAL" clId="{3495DFC1-9E0B-4456-8253-75922C6B6819}" dt="2023-02-22T02:36:39.413" v="466" actId="1076"/>
-          <ac:cxnSpMkLst>
-            <pc:docMk/>
-            <pc:sldMk cId="2882182165" sldId="259"/>
-            <ac:cxnSpMk id="16" creationId="{F3289941-0179-40CA-A34D-8D918E7F3FC1}"/>
-          </ac:cxnSpMkLst>
-        </pc:cxnChg>
-      </pc:sldChg>
-      <pc:sldChg chg="modSp">
-        <pc:chgData name="Marcia Moraes" userId="c9c67e8a-58e2-4733-9a1c-5d44fec4775b" providerId="ADAL" clId="{3495DFC1-9E0B-4456-8253-75922C6B6819}" dt="2023-02-22T01:45:12.025" v="259" actId="20577"/>
-        <pc:sldMkLst>
-          <pc:docMk/>
-          <pc:sldMk cId="4197111675" sldId="261"/>
-        </pc:sldMkLst>
-        <pc:spChg chg="mod">
-          <ac:chgData name="Marcia Moraes" userId="c9c67e8a-58e2-4733-9a1c-5d44fec4775b" providerId="ADAL" clId="{3495DFC1-9E0B-4456-8253-75922C6B6819}" dt="2023-02-22T01:45:12.025" v="259" actId="20577"/>
-          <ac:spMkLst>
-            <pc:docMk/>
-            <pc:sldMk cId="4197111675" sldId="261"/>
-            <ac:spMk id="5" creationId="{06C6B417-F89F-D941-9772-251340B9E7DD}"/>
-          </ac:spMkLst>
-        </pc:spChg>
-      </pc:sldChg>
-      <pc:sldChg chg="addSp delSp modSp">
-        <pc:chgData name="Marcia Moraes" userId="c9c67e8a-58e2-4733-9a1c-5d44fec4775b" providerId="ADAL" clId="{3495DFC1-9E0B-4456-8253-75922C6B6819}" dt="2023-02-22T01:51:35.650" v="305" actId="1076"/>
-        <pc:sldMkLst>
-          <pc:docMk/>
-          <pc:sldMk cId="157662999" sldId="262"/>
-        </pc:sldMkLst>
-        <pc:spChg chg="del">
-          <ac:chgData name="Marcia Moraes" userId="c9c67e8a-58e2-4733-9a1c-5d44fec4775b" providerId="ADAL" clId="{3495DFC1-9E0B-4456-8253-75922C6B6819}" dt="2023-02-22T01:39:55.423" v="255" actId="478"/>
-          <ac:spMkLst>
-            <pc:docMk/>
-            <pc:sldMk cId="157662999" sldId="262"/>
-            <ac:spMk id="3" creationId="{70F36C5B-9C7E-1047-8360-1E8B782A1CC7}"/>
-          </ac:spMkLst>
-        </pc:spChg>
-        <pc:spChg chg="add del mod">
-          <ac:chgData name="Marcia Moraes" userId="c9c67e8a-58e2-4733-9a1c-5d44fec4775b" providerId="ADAL" clId="{3495DFC1-9E0B-4456-8253-75922C6B6819}" dt="2023-02-22T01:39:59.728" v="256" actId="478"/>
-          <ac:spMkLst>
-            <pc:docMk/>
-            <pc:sldMk cId="157662999" sldId="262"/>
-            <ac:spMk id="7" creationId="{3390E1D9-3DED-493B-828E-2DFF1B7E34F2}"/>
-          </ac:spMkLst>
-        </pc:spChg>
-        <pc:spChg chg="add mod">
-          <ac:chgData name="Marcia Moraes" userId="c9c67e8a-58e2-4733-9a1c-5d44fec4775b" providerId="ADAL" clId="{3495DFC1-9E0B-4456-8253-75922C6B6819}" dt="2023-02-22T01:51:35.650" v="305" actId="1076"/>
-          <ac:spMkLst>
-            <pc:docMk/>
-            <pc:sldMk cId="157662999" sldId="262"/>
-            <ac:spMk id="9" creationId="{2CBE8489-659F-4CE4-B473-ADAA78BFED28}"/>
-          </ac:spMkLst>
-        </pc:spChg>
-        <pc:spChg chg="add del mod">
-          <ac:chgData name="Marcia Moraes" userId="c9c67e8a-58e2-4733-9a1c-5d44fec4775b" providerId="ADAL" clId="{3495DFC1-9E0B-4456-8253-75922C6B6819}" dt="2023-02-22T01:51:02.232" v="298" actId="478"/>
-          <ac:spMkLst>
-            <pc:docMk/>
-            <pc:sldMk cId="157662999" sldId="262"/>
-            <ac:spMk id="10" creationId="{18A1EF48-8971-4885-A4C0-DE8DA784929A}"/>
-          </ac:spMkLst>
-        </pc:spChg>
-      </pc:sldChg>
-      <pc:sldChg chg="addSp delSp modSp">
-        <pc:chgData name="Marcia Moraes" userId="c9c67e8a-58e2-4733-9a1c-5d44fec4775b" providerId="ADAL" clId="{3495DFC1-9E0B-4456-8253-75922C6B6819}" dt="2023-02-22T01:52:30.330" v="306" actId="478"/>
-        <pc:sldMkLst>
-          <pc:docMk/>
-          <pc:sldMk cId="149770216" sldId="265"/>
-        </pc:sldMkLst>
-        <pc:spChg chg="add mod">
-          <ac:chgData name="Marcia Moraes" userId="c9c67e8a-58e2-4733-9a1c-5d44fec4775b" providerId="ADAL" clId="{3495DFC1-9E0B-4456-8253-75922C6B6819}" dt="2023-02-22T01:52:30.330" v="306" actId="478"/>
-          <ac:spMkLst>
-            <pc:docMk/>
-            <pc:sldMk cId="149770216" sldId="265"/>
-            <ac:spMk id="3" creationId="{EDE54E0C-A7F7-4F09-90E2-3B52A2980362}"/>
-          </ac:spMkLst>
-        </pc:spChg>
-        <pc:spChg chg="del">
-          <ac:chgData name="Marcia Moraes" userId="c9c67e8a-58e2-4733-9a1c-5d44fec4775b" providerId="ADAL" clId="{3495DFC1-9E0B-4456-8253-75922C6B6819}" dt="2023-02-22T01:52:30.330" v="306" actId="478"/>
-          <ac:spMkLst>
-            <pc:docMk/>
-            <pc:sldMk cId="149770216" sldId="265"/>
-            <ac:spMk id="5" creationId="{DDEDC6FF-9F34-4EC7-9516-84ECBEE8FC2D}"/>
-          </ac:spMkLst>
-        </pc:spChg>
-      </pc:sldChg>
-      <pc:sldChg chg="del">
-        <pc:chgData name="Marcia Moraes" userId="c9c67e8a-58e2-4733-9a1c-5d44fec4775b" providerId="ADAL" clId="{3495DFC1-9E0B-4456-8253-75922C6B6819}" dt="2023-02-22T00:44:10.951" v="1" actId="2696"/>
-        <pc:sldMkLst>
-          <pc:docMk/>
-          <pc:sldMk cId="926474781" sldId="269"/>
-        </pc:sldMkLst>
-      </pc:sldChg>
-      <pc:sldChg chg="addSp delSp modSp add">
-        <pc:chgData name="Marcia Moraes" userId="c9c67e8a-58e2-4733-9a1c-5d44fec4775b" providerId="ADAL" clId="{3495DFC1-9E0B-4456-8253-75922C6B6819}" dt="2023-02-22T01:01:58.180" v="45" actId="1076"/>
+      <pc:sldChg chg="addSp modSp">
+        <pc:chgData name="Marcia Moraes" userId="c9c67e8a-58e2-4733-9a1c-5d44fec4775b" providerId="ADAL" clId="{0251B3BA-5450-4D15-BEE8-7017FEF9B9ED}" dt="2023-09-14T14:00:00.814" v="140" actId="1076"/>
         <pc:sldMkLst>
           <pc:docMk/>
           <pc:sldMk cId="2019265180" sldId="270"/>
         </pc:sldMkLst>
         <pc:spChg chg="mod">
-          <ac:chgData name="Marcia Moraes" userId="c9c67e8a-58e2-4733-9a1c-5d44fec4775b" providerId="ADAL" clId="{3495DFC1-9E0B-4456-8253-75922C6B6819}" dt="2023-02-22T01:01:58.180" v="45" actId="1076"/>
-          <ac:spMkLst>
-            <pc:docMk/>
-            <pc:sldMk cId="2019265180" sldId="270"/>
-            <ac:spMk id="2" creationId="{05CD00A8-A4FA-4E9B-9199-C0E207B0496C}"/>
-          </ac:spMkLst>
-        </pc:spChg>
-        <pc:spChg chg="mod">
-          <ac:chgData name="Marcia Moraes" userId="c9c67e8a-58e2-4733-9a1c-5d44fec4775b" providerId="ADAL" clId="{3495DFC1-9E0B-4456-8253-75922C6B6819}" dt="2023-02-22T00:45:30.404" v="34" actId="20577"/>
+          <ac:chgData name="Marcia Moraes" userId="c9c67e8a-58e2-4733-9a1c-5d44fec4775b" providerId="ADAL" clId="{0251B3BA-5450-4D15-BEE8-7017FEF9B9ED}" dt="2023-09-14T13:56:12.842" v="138" actId="20577"/>
           <ac:spMkLst>
             <pc:docMk/>
             <pc:sldMk cId="2019265180" sldId="270"/>
             <ac:spMk id="7" creationId="{900B76C7-4821-426C-9C80-6ADC6DD0EA77}"/>
           </ac:spMkLst>
         </pc:spChg>
-        <pc:picChg chg="add del mod">
-          <ac:chgData name="Marcia Moraes" userId="c9c67e8a-58e2-4733-9a1c-5d44fec4775b" providerId="ADAL" clId="{3495DFC1-9E0B-4456-8253-75922C6B6819}" dt="2023-02-22T01:01:19.664" v="38" actId="478"/>
-          <ac:picMkLst>
+        <pc:spChg chg="add mod">
+          <ac:chgData name="Marcia Moraes" userId="c9c67e8a-58e2-4733-9a1c-5d44fec4775b" providerId="ADAL" clId="{0251B3BA-5450-4D15-BEE8-7017FEF9B9ED}" dt="2023-09-14T14:00:00.814" v="140" actId="1076"/>
+          <ac:spMkLst>
             <pc:docMk/>
             <pc:sldMk cId="2019265180" sldId="270"/>
-            <ac:picMk id="3" creationId="{0D85EBE3-94FB-4191-AFE5-264063F59CA0}"/>
-          </ac:picMkLst>
-        </pc:picChg>
-        <pc:picChg chg="del">
-          <ac:chgData name="Marcia Moraes" userId="c9c67e8a-58e2-4733-9a1c-5d44fec4775b" providerId="ADAL" clId="{3495DFC1-9E0B-4456-8253-75922C6B6819}" dt="2023-02-22T00:45:37.672" v="35" actId="478"/>
-          <ac:picMkLst>
+            <ac:spMk id="8" creationId="{693D57F6-9630-4076-8528-D9DA6F942571}"/>
+          </ac:spMkLst>
+        </pc:spChg>
+        <pc:graphicFrameChg chg="add mod">
+          <ac:chgData name="Marcia Moraes" userId="c9c67e8a-58e2-4733-9a1c-5d44fec4775b" providerId="ADAL" clId="{0251B3BA-5450-4D15-BEE8-7017FEF9B9ED}" dt="2023-09-14T14:00:00.814" v="140" actId="1076"/>
+          <ac:graphicFrameMkLst>
             <pc:docMk/>
             <pc:sldMk cId="2019265180" sldId="270"/>
-            <ac:picMk id="1026" creationId="{2F52058F-C3E3-480C-9500-8136CF027CEE}"/>
-          </ac:picMkLst>
-        </pc:picChg>
-        <pc:picChg chg="add mod">
-          <ac:chgData name="Marcia Moraes" userId="c9c67e8a-58e2-4733-9a1c-5d44fec4775b" providerId="ADAL" clId="{3495DFC1-9E0B-4456-8253-75922C6B6819}" dt="2023-02-22T01:01:31.665" v="43" actId="1076"/>
-          <ac:picMkLst>
-            <pc:docMk/>
-            <pc:sldMk cId="2019265180" sldId="270"/>
-            <ac:picMk id="1028" creationId="{CC9B3497-F325-4068-931A-CE35C7BD7EA5}"/>
-          </ac:picMkLst>
-        </pc:picChg>
+            <ac:graphicFrameMk id="6" creationId="{EDFDECD2-5FE8-4786-81E5-DD1620705A1D}"/>
+          </ac:graphicFrameMkLst>
+        </pc:graphicFrameChg>
       </pc:sldChg>
-      <pc:sldChg chg="add">
-        <pc:chgData name="Marcia Moraes" userId="c9c67e8a-58e2-4733-9a1c-5d44fec4775b" providerId="ADAL" clId="{3495DFC1-9E0B-4456-8253-75922C6B6819}" dt="2023-02-22T01:10:04.631" v="61"/>
-        <pc:sldMkLst>
-          <pc:docMk/>
-          <pc:sldMk cId="1347173178" sldId="271"/>
-        </pc:sldMkLst>
-      </pc:sldChg>
-      <pc:sldChg chg="delSp modSp add">
-        <pc:chgData name="Marcia Moraes" userId="c9c67e8a-58e2-4733-9a1c-5d44fec4775b" providerId="ADAL" clId="{3495DFC1-9E0B-4456-8253-75922C6B6819}" dt="2023-02-22T01:13:58.885" v="179" actId="20577"/>
+      <pc:sldChg chg="modSp">
+        <pc:chgData name="Marcia Moraes" userId="c9c67e8a-58e2-4733-9a1c-5d44fec4775b" providerId="ADAL" clId="{0251B3BA-5450-4D15-BEE8-7017FEF9B9ED}" dt="2023-09-14T13:45:52.092" v="103"/>
         <pc:sldMkLst>
           <pc:docMk/>
           <pc:sldMk cId="2302936247" sldId="272"/>
         </pc:sldMkLst>
         <pc:spChg chg="mod">
-          <ac:chgData name="Marcia Moraes" userId="c9c67e8a-58e2-4733-9a1c-5d44fec4775b" providerId="ADAL" clId="{3495DFC1-9E0B-4456-8253-75922C6B6819}" dt="2023-02-22T01:12:29.925" v="92" actId="20577"/>
-          <ac:spMkLst>
-            <pc:docMk/>
-            <pc:sldMk cId="2302936247" sldId="272"/>
-            <ac:spMk id="4" creationId="{D6148A1E-4BB9-3E41-9954-7E0FE5CDE376}"/>
-          </ac:spMkLst>
-        </pc:spChg>
-        <pc:spChg chg="mod">
-          <ac:chgData name="Marcia Moraes" userId="c9c67e8a-58e2-4733-9a1c-5d44fec4775b" providerId="ADAL" clId="{3495DFC1-9E0B-4456-8253-75922C6B6819}" dt="2023-02-22T01:13:58.885" v="179" actId="20577"/>
+          <ac:chgData name="Marcia Moraes" userId="c9c67e8a-58e2-4733-9a1c-5d44fec4775b" providerId="ADAL" clId="{0251B3BA-5450-4D15-BEE8-7017FEF9B9ED}" dt="2023-09-14T13:45:52.092" v="103"/>
           <ac:spMkLst>
             <pc:docMk/>
             <pc:sldMk cId="2302936247" sldId="272"/>
             <ac:spMk id="5" creationId="{60370ACD-6E3D-5D4E-8918-7EDF38D2E5B4}"/>
           </ac:spMkLst>
         </pc:spChg>
-        <pc:spChg chg="del">
-          <ac:chgData name="Marcia Moraes" userId="c9c67e8a-58e2-4733-9a1c-5d44fec4775b" providerId="ADAL" clId="{3495DFC1-9E0B-4456-8253-75922C6B6819}" dt="2023-02-22T01:13:16.025" v="93" actId="478"/>
-          <ac:spMkLst>
-            <pc:docMk/>
-            <pc:sldMk cId="2302936247" sldId="272"/>
-            <ac:spMk id="6" creationId="{5B0F3AC0-CAD8-D243-AE80-9528F11067ED}"/>
-          </ac:spMkLst>
-        </pc:spChg>
-        <pc:spChg chg="del">
-          <ac:chgData name="Marcia Moraes" userId="c9c67e8a-58e2-4733-9a1c-5d44fec4775b" providerId="ADAL" clId="{3495DFC1-9E0B-4456-8253-75922C6B6819}" dt="2023-02-22T01:13:39.339" v="152" actId="478"/>
-          <ac:spMkLst>
-            <pc:docMk/>
-            <pc:sldMk cId="2302936247" sldId="272"/>
-            <ac:spMk id="7" creationId="{AEC06065-364B-654F-8CBE-449502045610}"/>
-          </ac:spMkLst>
-        </pc:spChg>
       </pc:sldChg>
-      <pc:sldChg chg="addSp delSp modSp add delAnim">
-        <pc:chgData name="Marcia Moraes" userId="c9c67e8a-58e2-4733-9a1c-5d44fec4775b" providerId="ADAL" clId="{3495DFC1-9E0B-4456-8253-75922C6B6819}" dt="2023-02-22T02:36:15.436" v="461" actId="1076"/>
-        <pc:sldMkLst>
-          <pc:docMk/>
-          <pc:sldMk cId="2614849023" sldId="273"/>
-        </pc:sldMkLst>
-        <pc:spChg chg="mod">
-          <ac:chgData name="Marcia Moraes" userId="c9c67e8a-58e2-4733-9a1c-5d44fec4775b" providerId="ADAL" clId="{3495DFC1-9E0B-4456-8253-75922C6B6819}" dt="2023-02-22T01:22:33.427" v="212" actId="20577"/>
-          <ac:spMkLst>
-            <pc:docMk/>
-            <pc:sldMk cId="2614849023" sldId="273"/>
-            <ac:spMk id="2" creationId="{932865F0-BFCE-0E4A-A17D-30F7A46CD811}"/>
-          </ac:spMkLst>
-        </pc:spChg>
-        <pc:spChg chg="del">
-          <ac:chgData name="Marcia Moraes" userId="c9c67e8a-58e2-4733-9a1c-5d44fec4775b" providerId="ADAL" clId="{3495DFC1-9E0B-4456-8253-75922C6B6819}" dt="2023-02-22T01:22:26.960" v="201" actId="478"/>
-          <ac:spMkLst>
-            <pc:docMk/>
-            <pc:sldMk cId="2614849023" sldId="273"/>
-            <ac:spMk id="3" creationId="{1DC58C9F-5CBD-034F-9A6A-2105E76A162F}"/>
-          </ac:spMkLst>
-        </pc:spChg>
-        <pc:spChg chg="del">
-          <ac:chgData name="Marcia Moraes" userId="c9c67e8a-58e2-4733-9a1c-5d44fec4775b" providerId="ADAL" clId="{3495DFC1-9E0B-4456-8253-75922C6B6819}" dt="2023-02-22T01:22:26.960" v="201" actId="478"/>
-          <ac:spMkLst>
-            <pc:docMk/>
-            <pc:sldMk cId="2614849023" sldId="273"/>
-            <ac:spMk id="5" creationId="{5EC5E1D6-40E7-CE46-89AF-C4B5A220E742}"/>
-          </ac:spMkLst>
-        </pc:spChg>
-        <pc:spChg chg="add del mod">
-          <ac:chgData name="Marcia Moraes" userId="c9c67e8a-58e2-4733-9a1c-5d44fec4775b" providerId="ADAL" clId="{3495DFC1-9E0B-4456-8253-75922C6B6819}" dt="2023-02-22T01:31:41.785" v="219" actId="478"/>
-          <ac:spMkLst>
-            <pc:docMk/>
-            <pc:sldMk cId="2614849023" sldId="273"/>
-            <ac:spMk id="6" creationId="{FCCCC053-A1C1-4BF8-B447-6A1E5CC309C2}"/>
-          </ac:spMkLst>
-        </pc:spChg>
-        <pc:spChg chg="del">
-          <ac:chgData name="Marcia Moraes" userId="c9c67e8a-58e2-4733-9a1c-5d44fec4775b" providerId="ADAL" clId="{3495DFC1-9E0B-4456-8253-75922C6B6819}" dt="2023-02-22T01:22:26.960" v="201" actId="478"/>
-          <ac:spMkLst>
-            <pc:docMk/>
-            <pc:sldMk cId="2614849023" sldId="273"/>
-            <ac:spMk id="8" creationId="{44A507A9-B1AE-3846-8CDF-8BDEDC131F9C}"/>
-          </ac:spMkLst>
-        </pc:spChg>
-        <pc:spChg chg="add mod">
-          <ac:chgData name="Marcia Moraes" userId="c9c67e8a-58e2-4733-9a1c-5d44fec4775b" providerId="ADAL" clId="{3495DFC1-9E0B-4456-8253-75922C6B6819}" dt="2023-02-22T01:31:50.668" v="220" actId="2085"/>
-          <ac:spMkLst>
-            <pc:docMk/>
-            <pc:sldMk cId="2614849023" sldId="273"/>
-            <ac:spMk id="9" creationId="{B853C825-0F25-4A49-A738-D186A8A0C62A}"/>
-          </ac:spMkLst>
-        </pc:spChg>
-        <pc:spChg chg="del">
-          <ac:chgData name="Marcia Moraes" userId="c9c67e8a-58e2-4733-9a1c-5d44fec4775b" providerId="ADAL" clId="{3495DFC1-9E0B-4456-8253-75922C6B6819}" dt="2023-02-22T01:22:26.960" v="201" actId="478"/>
-          <ac:spMkLst>
-            <pc:docMk/>
-            <pc:sldMk cId="2614849023" sldId="273"/>
-            <ac:spMk id="10" creationId="{B0432A09-841C-F442-A8F6-D5457488C9F9}"/>
-          </ac:spMkLst>
-        </pc:spChg>
-        <pc:spChg chg="del">
-          <ac:chgData name="Marcia Moraes" userId="c9c67e8a-58e2-4733-9a1c-5d44fec4775b" providerId="ADAL" clId="{3495DFC1-9E0B-4456-8253-75922C6B6819}" dt="2023-02-22T01:22:26.960" v="201" actId="478"/>
-          <ac:spMkLst>
-            <pc:docMk/>
-            <pc:sldMk cId="2614849023" sldId="273"/>
-            <ac:spMk id="11" creationId="{7E2698F8-C96D-484B-9B7A-BB3CC974BCC2}"/>
-          </ac:spMkLst>
-        </pc:spChg>
-        <pc:spChg chg="add mod">
-          <ac:chgData name="Marcia Moraes" userId="c9c67e8a-58e2-4733-9a1c-5d44fec4775b" providerId="ADAL" clId="{3495DFC1-9E0B-4456-8253-75922C6B6819}" dt="2023-02-22T01:32:30.701" v="227" actId="692"/>
-          <ac:spMkLst>
-            <pc:docMk/>
-            <pc:sldMk cId="2614849023" sldId="273"/>
-            <ac:spMk id="12" creationId="{51AF0C10-EB93-49C4-9266-7344E0B21263}"/>
-          </ac:spMkLst>
-        </pc:spChg>
-        <pc:spChg chg="add mod">
-          <ac:chgData name="Marcia Moraes" userId="c9c67e8a-58e2-4733-9a1c-5d44fec4775b" providerId="ADAL" clId="{3495DFC1-9E0B-4456-8253-75922C6B6819}" dt="2023-02-22T02:36:15.436" v="461" actId="1076"/>
-          <ac:spMkLst>
-            <pc:docMk/>
-            <pc:sldMk cId="2614849023" sldId="273"/>
-            <ac:spMk id="14" creationId="{E7484530-89C3-4800-BACD-8255944C2D0B}"/>
-          </ac:spMkLst>
-        </pc:spChg>
-        <pc:spChg chg="del">
-          <ac:chgData name="Marcia Moraes" userId="c9c67e8a-58e2-4733-9a1c-5d44fec4775b" providerId="ADAL" clId="{3495DFC1-9E0B-4456-8253-75922C6B6819}" dt="2023-02-22T01:22:26.960" v="201" actId="478"/>
-          <ac:spMkLst>
-            <pc:docMk/>
-            <pc:sldMk cId="2614849023" sldId="273"/>
-            <ac:spMk id="15" creationId="{50B82A2A-57A7-B446-BF62-3FEDF34014DA}"/>
-          </ac:spMkLst>
-        </pc:spChg>
-        <pc:spChg chg="del">
-          <ac:chgData name="Marcia Moraes" userId="c9c67e8a-58e2-4733-9a1c-5d44fec4775b" providerId="ADAL" clId="{3495DFC1-9E0B-4456-8253-75922C6B6819}" dt="2023-02-22T01:22:26.960" v="201" actId="478"/>
-          <ac:spMkLst>
-            <pc:docMk/>
-            <pc:sldMk cId="2614849023" sldId="273"/>
-            <ac:spMk id="18" creationId="{25EB3B28-039F-DD45-B27D-DFA3541ECCB0}"/>
-          </ac:spMkLst>
-        </pc:spChg>
-        <pc:spChg chg="del">
-          <ac:chgData name="Marcia Moraes" userId="c9c67e8a-58e2-4733-9a1c-5d44fec4775b" providerId="ADAL" clId="{3495DFC1-9E0B-4456-8253-75922C6B6819}" dt="2023-02-22T01:22:26.960" v="201" actId="478"/>
-          <ac:spMkLst>
-            <pc:docMk/>
-            <pc:sldMk cId="2614849023" sldId="273"/>
-            <ac:spMk id="26" creationId="{23B5807A-4B36-4842-AA66-7359FADD27B3}"/>
-          </ac:spMkLst>
-        </pc:spChg>
-        <pc:picChg chg="del">
-          <ac:chgData name="Marcia Moraes" userId="c9c67e8a-58e2-4733-9a1c-5d44fec4775b" providerId="ADAL" clId="{3495DFC1-9E0B-4456-8253-75922C6B6819}" dt="2023-02-22T01:22:26.960" v="201" actId="478"/>
-          <ac:picMkLst>
-            <pc:docMk/>
-            <pc:sldMk cId="2614849023" sldId="273"/>
-            <ac:picMk id="1026" creationId="{11608DC2-2D8B-4D4C-B6E8-C8208B0BB58D}"/>
-          </ac:picMkLst>
-        </pc:picChg>
-        <pc:picChg chg="del">
-          <ac:chgData name="Marcia Moraes" userId="c9c67e8a-58e2-4733-9a1c-5d44fec4775b" providerId="ADAL" clId="{3495DFC1-9E0B-4456-8253-75922C6B6819}" dt="2023-02-22T01:22:26.960" v="201" actId="478"/>
-          <ac:picMkLst>
-            <pc:docMk/>
-            <pc:sldMk cId="2614849023" sldId="273"/>
-            <ac:picMk id="1027" creationId="{D0A970B9-31DD-4348-A8C1-3B838C34CAA6}"/>
-          </ac:picMkLst>
-        </pc:picChg>
-        <pc:cxnChg chg="del mod">
-          <ac:chgData name="Marcia Moraes" userId="c9c67e8a-58e2-4733-9a1c-5d44fec4775b" providerId="ADAL" clId="{3495DFC1-9E0B-4456-8253-75922C6B6819}" dt="2023-02-22T01:22:26.960" v="201" actId="478"/>
-          <ac:cxnSpMkLst>
-            <pc:docMk/>
-            <pc:sldMk cId="2614849023" sldId="273"/>
-            <ac:cxnSpMk id="7" creationId="{BF12D9D8-08D2-7642-91EB-6127376F97BA}"/>
-          </ac:cxnSpMkLst>
-        </pc:cxnChg>
-        <pc:cxnChg chg="del mod">
-          <ac:chgData name="Marcia Moraes" userId="c9c67e8a-58e2-4733-9a1c-5d44fec4775b" providerId="ADAL" clId="{3495DFC1-9E0B-4456-8253-75922C6B6819}" dt="2023-02-22T01:22:26.960" v="201" actId="478"/>
-          <ac:cxnSpMkLst>
-            <pc:docMk/>
-            <pc:sldMk cId="2614849023" sldId="273"/>
-            <ac:cxnSpMk id="13" creationId="{8F67C512-F019-404C-AFE1-4D54D6B1E65D}"/>
-          </ac:cxnSpMkLst>
-        </pc:cxnChg>
-        <pc:cxnChg chg="del mod">
-          <ac:chgData name="Marcia Moraes" userId="c9c67e8a-58e2-4733-9a1c-5d44fec4775b" providerId="ADAL" clId="{3495DFC1-9E0B-4456-8253-75922C6B6819}" dt="2023-02-22T01:22:26.960" v="201" actId="478"/>
-          <ac:cxnSpMkLst>
-            <pc:docMk/>
-            <pc:sldMk cId="2614849023" sldId="273"/>
-            <ac:cxnSpMk id="17" creationId="{4317D5F9-1B9C-5E47-8F0C-010653DD7A5A}"/>
-          </ac:cxnSpMkLst>
-        </pc:cxnChg>
-        <pc:cxnChg chg="del mod">
-          <ac:chgData name="Marcia Moraes" userId="c9c67e8a-58e2-4733-9a1c-5d44fec4775b" providerId="ADAL" clId="{3495DFC1-9E0B-4456-8253-75922C6B6819}" dt="2023-02-22T01:22:26.960" v="201" actId="478"/>
-          <ac:cxnSpMkLst>
-            <pc:docMk/>
-            <pc:sldMk cId="2614849023" sldId="273"/>
-            <ac:cxnSpMk id="20" creationId="{59A779D5-1BEE-A547-9666-FE9382D420CA}"/>
-          </ac:cxnSpMkLst>
-        </pc:cxnChg>
-      </pc:sldChg>
-      <pc:sldChg chg="addSp modSp add">
-        <pc:chgData name="Marcia Moraes" userId="c9c67e8a-58e2-4733-9a1c-5d44fec4775b" providerId="ADAL" clId="{3495DFC1-9E0B-4456-8253-75922C6B6819}" dt="2023-02-22T01:34:14.313" v="254" actId="1076"/>
-        <pc:sldMkLst>
-          <pc:docMk/>
-          <pc:sldMk cId="1251443658" sldId="274"/>
-        </pc:sldMkLst>
-        <pc:spChg chg="mod">
-          <ac:chgData name="Marcia Moraes" userId="c9c67e8a-58e2-4733-9a1c-5d44fec4775b" providerId="ADAL" clId="{3495DFC1-9E0B-4456-8253-75922C6B6819}" dt="2023-02-22T01:34:06.252" v="253" actId="1076"/>
-          <ac:spMkLst>
-            <pc:docMk/>
-            <pc:sldMk cId="1251443658" sldId="274"/>
-            <ac:spMk id="14" creationId="{E7484530-89C3-4800-BACD-8255944C2D0B}"/>
-          </ac:spMkLst>
-        </pc:spChg>
-        <pc:picChg chg="add mod">
-          <ac:chgData name="Marcia Moraes" userId="c9c67e8a-58e2-4733-9a1c-5d44fec4775b" providerId="ADAL" clId="{3495DFC1-9E0B-4456-8253-75922C6B6819}" dt="2023-02-22T01:34:14.313" v="254" actId="1076"/>
-          <ac:picMkLst>
-            <pc:docMk/>
-            <pc:sldMk cId="1251443658" sldId="274"/>
-            <ac:picMk id="3" creationId="{E5B4F97F-79B9-46B9-BF7B-3A59D617435C}"/>
-          </ac:picMkLst>
-        </pc:picChg>
-      </pc:sldChg>
-      <pc:sldChg chg="add">
-        <pc:chgData name="Marcia Moraes" userId="c9c67e8a-58e2-4733-9a1c-5d44fec4775b" providerId="ADAL" clId="{3495DFC1-9E0B-4456-8253-75922C6B6819}" dt="2023-02-22T01:59:18.779" v="379"/>
-        <pc:sldMkLst>
-          <pc:docMk/>
-          <pc:sldMk cId="3979271074" sldId="275"/>
-        </pc:sldMkLst>
-      </pc:sldChg>
-      <pc:sldChg chg="addSp delSp modSp add">
-        <pc:chgData name="Marcia Moraes" userId="c9c67e8a-58e2-4733-9a1c-5d44fec4775b" providerId="ADAL" clId="{3495DFC1-9E0B-4456-8253-75922C6B6819}" dt="2023-02-22T02:41:01.487" v="653" actId="1076"/>
+      <pc:sldChg chg="modSp">
+        <pc:chgData name="Marcia Moraes" userId="c9c67e8a-58e2-4733-9a1c-5d44fec4775b" providerId="ADAL" clId="{0251B3BA-5450-4D15-BEE8-7017FEF9B9ED}" dt="2023-09-14T13:47:33.607" v="117" actId="20577"/>
         <pc:sldMkLst>
           <pc:docMk/>
           <pc:sldMk cId="314544323" sldId="276"/>
         </pc:sldMkLst>
-        <pc:spChg chg="add mod">
-          <ac:chgData name="Marcia Moraes" userId="c9c67e8a-58e2-4733-9a1c-5d44fec4775b" providerId="ADAL" clId="{3495DFC1-9E0B-4456-8253-75922C6B6819}" dt="2023-02-22T02:40:45.566" v="651" actId="1076"/>
-          <ac:spMkLst>
-            <pc:docMk/>
-            <pc:sldMk cId="314544323" sldId="276"/>
-            <ac:spMk id="3" creationId="{7252816F-696B-4021-A0FA-BCC05B4AC5BD}"/>
-          </ac:spMkLst>
-        </pc:spChg>
-        <pc:spChg chg="add mod">
-          <ac:chgData name="Marcia Moraes" userId="c9c67e8a-58e2-4733-9a1c-5d44fec4775b" providerId="ADAL" clId="{3495DFC1-9E0B-4456-8253-75922C6B6819}" dt="2023-02-22T02:40:38.426" v="650" actId="1076"/>
+        <pc:spChg chg="mod">
+          <ac:chgData name="Marcia Moraes" userId="c9c67e8a-58e2-4733-9a1c-5d44fec4775b" providerId="ADAL" clId="{0251B3BA-5450-4D15-BEE8-7017FEF9B9ED}" dt="2023-09-14T13:47:33.607" v="117" actId="20577"/>
           <ac:spMkLst>
             <pc:docMk/>
             <pc:sldMk cId="314544323" sldId="276"/>
             <ac:spMk id="4" creationId="{74CC2087-2A8D-480B-84EE-71B7B33088F9}"/>
           </ac:spMkLst>
         </pc:spChg>
-        <pc:spChg chg="del">
-          <ac:chgData name="Marcia Moraes" userId="c9c67e8a-58e2-4733-9a1c-5d44fec4775b" providerId="ADAL" clId="{3495DFC1-9E0B-4456-8253-75922C6B6819}" dt="2023-02-22T02:37:46.877" v="470" actId="478"/>
-          <ac:spMkLst>
-            <pc:docMk/>
-            <pc:sldMk cId="314544323" sldId="276"/>
-            <ac:spMk id="6" creationId="{346AF321-782C-4F5B-B9BC-857DA2D94F8E}"/>
-          </ac:spMkLst>
-        </pc:spChg>
-        <pc:spChg chg="del">
-          <ac:chgData name="Marcia Moraes" userId="c9c67e8a-58e2-4733-9a1c-5d44fec4775b" providerId="ADAL" clId="{3495DFC1-9E0B-4456-8253-75922C6B6819}" dt="2023-02-22T02:37:57.746" v="474" actId="478"/>
-          <ac:spMkLst>
-            <pc:docMk/>
-            <pc:sldMk cId="314544323" sldId="276"/>
-            <ac:spMk id="7" creationId="{3728EE78-D4BC-4F43-9BDB-AAB279F702E0}"/>
-          </ac:spMkLst>
-        </pc:spChg>
-        <pc:cxnChg chg="add mod">
-          <ac:chgData name="Marcia Moraes" userId="c9c67e8a-58e2-4733-9a1c-5d44fec4775b" providerId="ADAL" clId="{3495DFC1-9E0B-4456-8253-75922C6B6819}" dt="2023-02-22T02:41:01.487" v="653" actId="1076"/>
-          <ac:cxnSpMkLst>
-            <pc:docMk/>
-            <pc:sldMk cId="314544323" sldId="276"/>
-            <ac:cxnSpMk id="10" creationId="{9E6E2659-B1C1-4772-8988-12EA86966041}"/>
-          </ac:cxnSpMkLst>
-        </pc:cxnChg>
-        <pc:cxnChg chg="add mod">
-          <ac:chgData name="Marcia Moraes" userId="c9c67e8a-58e2-4733-9a1c-5d44fec4775b" providerId="ADAL" clId="{3495DFC1-9E0B-4456-8253-75922C6B6819}" dt="2023-02-22T02:41:01.487" v="653" actId="1076"/>
-          <ac:cxnSpMkLst>
-            <pc:docMk/>
-            <pc:sldMk cId="314544323" sldId="276"/>
-            <ac:cxnSpMk id="11" creationId="{26545FE5-E77A-4DC7-84D8-6CC20E55DDD5}"/>
-          </ac:cxnSpMkLst>
-        </pc:cxnChg>
-        <pc:cxnChg chg="del">
-          <ac:chgData name="Marcia Moraes" userId="c9c67e8a-58e2-4733-9a1c-5d44fec4775b" providerId="ADAL" clId="{3495DFC1-9E0B-4456-8253-75922C6B6819}" dt="2023-02-22T02:38:02.401" v="477" actId="478"/>
-          <ac:cxnSpMkLst>
-            <pc:docMk/>
-            <pc:sldMk cId="314544323" sldId="276"/>
-            <ac:cxnSpMk id="12" creationId="{E13AF0E5-6E40-4DAF-8921-B0695F350ADA}"/>
-          </ac:cxnSpMkLst>
-        </pc:cxnChg>
-        <pc:cxnChg chg="add mod">
-          <ac:chgData name="Marcia Moraes" userId="c9c67e8a-58e2-4733-9a1c-5d44fec4775b" providerId="ADAL" clId="{3495DFC1-9E0B-4456-8253-75922C6B6819}" dt="2023-02-22T02:41:01.487" v="653" actId="1076"/>
-          <ac:cxnSpMkLst>
-            <pc:docMk/>
-            <pc:sldMk cId="314544323" sldId="276"/>
-            <ac:cxnSpMk id="13" creationId="{5A3F669D-B527-489F-B410-88E28B583B31}"/>
-          </ac:cxnSpMkLst>
-        </pc:cxnChg>
-        <pc:cxnChg chg="del">
-          <ac:chgData name="Marcia Moraes" userId="c9c67e8a-58e2-4733-9a1c-5d44fec4775b" providerId="ADAL" clId="{3495DFC1-9E0B-4456-8253-75922C6B6819}" dt="2023-02-22T02:38:01.627" v="476" actId="478"/>
-          <ac:cxnSpMkLst>
-            <pc:docMk/>
-            <pc:sldMk cId="314544323" sldId="276"/>
-            <ac:cxnSpMk id="14" creationId="{B701EFE0-F742-4EA1-B9AB-2D0DC8F66A38}"/>
-          </ac:cxnSpMkLst>
-        </pc:cxnChg>
-        <pc:cxnChg chg="del">
-          <ac:chgData name="Marcia Moraes" userId="c9c67e8a-58e2-4733-9a1c-5d44fec4775b" providerId="ADAL" clId="{3495DFC1-9E0B-4456-8253-75922C6B6819}" dt="2023-02-22T02:38:00.761" v="475" actId="478"/>
-          <ac:cxnSpMkLst>
-            <pc:docMk/>
-            <pc:sldMk cId="314544323" sldId="276"/>
-            <ac:cxnSpMk id="16" creationId="{F3289941-0179-40CA-A34D-8D918E7F3FC1}"/>
-          </ac:cxnSpMkLst>
-        </pc:cxnChg>
       </pc:sldChg>
-      <pc:sldMasterChg chg="modSldLayout">
-        <pc:chgData name="Marcia Moraes" userId="c9c67e8a-58e2-4733-9a1c-5d44fec4775b" providerId="ADAL" clId="{3495DFC1-9E0B-4456-8253-75922C6B6819}" dt="2023-02-22T01:54:36.578" v="378" actId="14100"/>
-        <pc:sldMasterMkLst>
-          <pc:docMk/>
-          <pc:sldMasterMk cId="3965733437" sldId="2147483648"/>
-        </pc:sldMasterMkLst>
-        <pc:sldLayoutChg chg="modSp">
-          <pc:chgData name="Marcia Moraes" userId="c9c67e8a-58e2-4733-9a1c-5d44fec4775b" providerId="ADAL" clId="{3495DFC1-9E0B-4456-8253-75922C6B6819}" dt="2023-02-22T01:54:36.578" v="378" actId="14100"/>
-          <pc:sldLayoutMkLst>
-            <pc:docMk/>
-            <pc:sldMasterMk cId="3965733437" sldId="2147483648"/>
-            <pc:sldLayoutMk cId="0" sldId="2147483689"/>
-          </pc:sldLayoutMkLst>
-          <pc:spChg chg="mod">
-            <ac:chgData name="Marcia Moraes" userId="c9c67e8a-58e2-4733-9a1c-5d44fec4775b" providerId="ADAL" clId="{3495DFC1-9E0B-4456-8253-75922C6B6819}" dt="2023-02-22T01:53:53.743" v="309" actId="1076"/>
-            <ac:spMkLst>
-              <pc:docMk/>
-              <pc:sldMasterMk cId="3965733437" sldId="2147483648"/>
-              <pc:sldLayoutMk cId="0" sldId="2147483689"/>
-              <ac:spMk id="9" creationId="{518974DB-51D0-2C49-9088-48CE2D84AB1C}"/>
-            </ac:spMkLst>
-          </pc:spChg>
-          <pc:spChg chg="mod">
-            <ac:chgData name="Marcia Moraes" userId="c9c67e8a-58e2-4733-9a1c-5d44fec4775b" providerId="ADAL" clId="{3495DFC1-9E0B-4456-8253-75922C6B6819}" dt="2023-02-22T01:54:36.578" v="378" actId="14100"/>
-            <ac:spMkLst>
-              <pc:docMk/>
-              <pc:sldMasterMk cId="3965733437" sldId="2147483648"/>
-              <pc:sldLayoutMk cId="0" sldId="2147483689"/>
-              <ac:spMk id="11" creationId="{F621E987-BD36-AF48-B11C-CC4BAD65092F}"/>
-            </ac:spMkLst>
-          </pc:spChg>
-          <pc:picChg chg="mod">
-            <ac:chgData name="Marcia Moraes" userId="c9c67e8a-58e2-4733-9a1c-5d44fec4775b" providerId="ADAL" clId="{3495DFC1-9E0B-4456-8253-75922C6B6819}" dt="2023-02-22T01:53:58.843" v="310" actId="1076"/>
-            <ac:picMkLst>
-              <pc:docMk/>
-              <pc:sldMasterMk cId="3965733437" sldId="2147483648"/>
-              <pc:sldLayoutMk cId="0" sldId="2147483689"/>
-              <ac:picMk id="5" creationId="{00000000-0000-0000-0000-000000000000}"/>
-            </ac:picMkLst>
-          </pc:picChg>
-          <pc:picChg chg="mod">
-            <ac:chgData name="Marcia Moraes" userId="c9c67e8a-58e2-4733-9a1c-5d44fec4775b" providerId="ADAL" clId="{3495DFC1-9E0B-4456-8253-75922C6B6819}" dt="2023-02-22T01:53:46.735" v="307" actId="1076"/>
-            <ac:picMkLst>
-              <pc:docMk/>
-              <pc:sldMasterMk cId="3965733437" sldId="2147483648"/>
-              <pc:sldLayoutMk cId="0" sldId="2147483689"/>
-              <ac:picMk id="7" creationId="{00000000-0000-0000-0000-000000000000}"/>
-            </ac:picMkLst>
-          </pc:picChg>
-        </pc:sldLayoutChg>
-      </pc:sldMasterChg>
     </pc:docChg>
   </pc:docChgLst>
 </pc:chgInfo>
@@ -1004,7 +311,7 @@
           <a:p>
             <a:fld id="{4D7E51A5-B478-1E40-8CBB-0DAA8831E99D}" type="datetimeFigureOut">
               <a:rPr lang="en-US" smtClean="0"/>
-              <a:t>2/21/2023</a:t>
+              <a:t>9/14/2023</a:t>
             </a:fld>
             <a:endParaRPr lang="en-US"/>
           </a:p>
@@ -1502,7 +809,7 @@
           <a:p>
             <a:fld id="{D0ED587F-861E-6740-9643-E3DDAE89B8D6}" type="datetimeFigureOut">
               <a:rPr lang="en-US" smtClean="0"/>
-              <a:t>2/21/2023</a:t>
+              <a:t>9/14/2023</a:t>
             </a:fld>
             <a:endParaRPr lang="en-US"/>
           </a:p>
@@ -9757,7 +9064,20 @@
                 <a:effectLst/>
                 <a:latin typeface="JetBrains Mono"/>
               </a:rPr>
-              <a:t>// the "L" at the end is how we tell java it is a</a:t>
+              <a:t>// the "L" at the end is how we tell java it </a:t>
+            </a:r>
+            <a:r>
+              <a:rPr kumimoji="0" lang="en-US" altLang="en-US" sz="1800" b="0" i="1" u="none" strike="noStrike" cap="none" normalizeH="0" baseline="0">
+                <a:ln>
+                  <a:noFill/>
+                </a:ln>
+                <a:solidFill>
+                  <a:srgbClr val="8C8C8C"/>
+                </a:solidFill>
+                <a:effectLst/>
+                <a:latin typeface="JetBrains Mono"/>
+              </a:rPr>
+              <a:t>is a long number</a:t>
             </a:r>
             <a:br>
               <a:rPr kumimoji="0" lang="en-US" altLang="en-US" sz="1800" b="0" i="1" u="none" strike="noStrike" cap="none" normalizeH="0" baseline="0" dirty="0">
@@ -24709,7 +24029,7 @@
                 <a:cs typeface="Arial"/>
                 <a:sym typeface="Arial"/>
               </a:rPr>
-              <a:t>Lab 07</a:t>
+              <a:t>Lab 07 – go to your lab to have your participation points</a:t>
             </a:r>
           </a:p>
           <a:p>
@@ -24811,7 +24131,7 @@
                 <a:cs typeface="Arial"/>
                 <a:sym typeface="Arial"/>
               </a:rPr>
-              <a:t>Lab 08</a:t>
+              <a:t>Lab 08 – go to your lab to have your participation points</a:t>
             </a:r>
           </a:p>
           <a:p>
@@ -25163,6 +24483,1033 @@
           </a:extLst>
         </p:spPr>
       </p:pic>
+      <p:graphicFrame>
+        <p:nvGraphicFramePr>
+          <p:cNvPr id="6" name="Table 5">
+            <a:extLst>
+              <a:ext uri="{FF2B5EF4-FFF2-40B4-BE49-F238E27FC236}">
+                <a16:creationId xmlns:a16="http://schemas.microsoft.com/office/drawing/2014/main" id="{EDFDECD2-5FE8-4786-81E5-DD1620705A1D}"/>
+              </a:ext>
+            </a:extLst>
+          </p:cNvPr>
+          <p:cNvGraphicFramePr>
+            <a:graphicFrameLocks noGrp="1"/>
+          </p:cNvGraphicFramePr>
+          <p:nvPr>
+            <p:extLst>
+              <p:ext uri="{D42A27DB-BD31-4B8C-83A1-F6EECF244321}">
+                <p14:modId xmlns:p14="http://schemas.microsoft.com/office/powerpoint/2010/main" val="2957314257"/>
+              </p:ext>
+            </p:extLst>
+          </p:nvPr>
+        </p:nvGraphicFramePr>
+        <p:xfrm>
+          <a:off x="10074154" y="4022886"/>
+          <a:ext cx="3671207" cy="3097098"/>
+        </p:xfrm>
+        <a:graphic>
+          <a:graphicData uri="http://schemas.openxmlformats.org/drawingml/2006/table">
+            <a:tbl>
+              <a:tblPr/>
+              <a:tblGrid>
+                <a:gridCol w="1197995">
+                  <a:extLst>
+                    <a:ext uri="{9D8B030D-6E8A-4147-A177-3AD203B41FA5}">
+                      <a16:colId xmlns:a16="http://schemas.microsoft.com/office/drawing/2014/main" val="3463123554"/>
+                    </a:ext>
+                  </a:extLst>
+                </a:gridCol>
+                <a:gridCol w="2473212">
+                  <a:extLst>
+                    <a:ext uri="{9D8B030D-6E8A-4147-A177-3AD203B41FA5}">
+                      <a16:colId xmlns:a16="http://schemas.microsoft.com/office/drawing/2014/main" val="378576746"/>
+                    </a:ext>
+                  </a:extLst>
+                </a:gridCol>
+              </a:tblGrid>
+              <a:tr h="289830">
+                <a:tc>
+                  <a:txBody>
+                    <a:bodyPr/>
+                    <a:lstStyle/>
+                    <a:p>
+                      <a:pPr algn="l"/>
+                      <a:r>
+                        <a:rPr lang="en-US" sz="1700">
+                          <a:solidFill>
+                            <a:srgbClr val="000000"/>
+                          </a:solidFill>
+                          <a:effectLst/>
+                        </a:rPr>
+                        <a:t>Day</a:t>
+                      </a:r>
+                    </a:p>
+                  </a:txBody>
+                  <a:tcPr marL="15681" marR="15681" marT="15681" marB="15681" anchor="ctr">
+                    <a:lnL w="6350" cap="flat" cmpd="sng" algn="ctr">
+                      <a:solidFill>
+                        <a:srgbClr val="E0E0E0"/>
+                      </a:solidFill>
+                      <a:prstDash val="solid"/>
+                      <a:round/>
+                      <a:headEnd type="none" w="med" len="med"/>
+                      <a:tailEnd type="none" w="med" len="med"/>
+                    </a:lnL>
+                    <a:lnR w="6350" cap="flat" cmpd="sng" algn="ctr">
+                      <a:solidFill>
+                        <a:srgbClr val="E0E0E0"/>
+                      </a:solidFill>
+                      <a:prstDash val="solid"/>
+                      <a:round/>
+                      <a:headEnd type="none" w="med" len="med"/>
+                      <a:tailEnd type="none" w="med" len="med"/>
+                    </a:lnR>
+                    <a:lnT w="6350" cap="flat" cmpd="sng" algn="ctr">
+                      <a:solidFill>
+                        <a:srgbClr val="E0E0E0"/>
+                      </a:solidFill>
+                      <a:prstDash val="solid"/>
+                      <a:round/>
+                      <a:headEnd type="none" w="med" len="med"/>
+                      <a:tailEnd type="none" w="med" len="med"/>
+                    </a:lnT>
+                    <a:lnB w="6350" cap="flat" cmpd="sng" algn="ctr">
+                      <a:solidFill>
+                        <a:srgbClr val="E0E0E0"/>
+                      </a:solidFill>
+                      <a:prstDash val="solid"/>
+                      <a:round/>
+                      <a:headEnd type="none" w="med" len="med"/>
+                      <a:tailEnd type="none" w="med" len="med"/>
+                    </a:lnB>
+                    <a:solidFill>
+                      <a:srgbClr val="F7F7F7"/>
+                    </a:solidFill>
+                  </a:tcPr>
+                </a:tc>
+                <a:tc>
+                  <a:txBody>
+                    <a:bodyPr/>
+                    <a:lstStyle/>
+                    <a:p>
+                      <a:pPr algn="l"/>
+                      <a:r>
+                        <a:rPr lang="en-US" sz="1700" dirty="0">
+                          <a:solidFill>
+                            <a:srgbClr val="000000"/>
+                          </a:solidFill>
+                          <a:effectLst/>
+                        </a:rPr>
+                        <a:t>Time : Room</a:t>
+                      </a:r>
+                    </a:p>
+                  </a:txBody>
+                  <a:tcPr marL="15681" marR="15681" marT="15681" marB="15681" anchor="ctr">
+                    <a:lnL w="6350" cap="flat" cmpd="sng" algn="ctr">
+                      <a:solidFill>
+                        <a:srgbClr val="E0E0E0"/>
+                      </a:solidFill>
+                      <a:prstDash val="solid"/>
+                      <a:round/>
+                      <a:headEnd type="none" w="med" len="med"/>
+                      <a:tailEnd type="none" w="med" len="med"/>
+                    </a:lnL>
+                    <a:lnR w="6350" cap="flat" cmpd="sng" algn="ctr">
+                      <a:solidFill>
+                        <a:srgbClr val="E0E0E0"/>
+                      </a:solidFill>
+                      <a:prstDash val="solid"/>
+                      <a:round/>
+                      <a:headEnd type="none" w="med" len="med"/>
+                      <a:tailEnd type="none" w="med" len="med"/>
+                    </a:lnR>
+                    <a:lnT w="6350" cap="flat" cmpd="sng" algn="ctr">
+                      <a:solidFill>
+                        <a:srgbClr val="E0E0E0"/>
+                      </a:solidFill>
+                      <a:prstDash val="solid"/>
+                      <a:round/>
+                      <a:headEnd type="none" w="med" len="med"/>
+                      <a:tailEnd type="none" w="med" len="med"/>
+                    </a:lnT>
+                    <a:lnB w="6350" cap="flat" cmpd="sng" algn="ctr">
+                      <a:solidFill>
+                        <a:srgbClr val="E0E0E0"/>
+                      </a:solidFill>
+                      <a:prstDash val="solid"/>
+                      <a:round/>
+                      <a:headEnd type="none" w="med" len="med"/>
+                      <a:tailEnd type="none" w="med" len="med"/>
+                    </a:lnB>
+                    <a:solidFill>
+                      <a:srgbClr val="F7F7F7"/>
+                    </a:solidFill>
+                  </a:tcPr>
+                </a:tc>
+                <a:extLst>
+                  <a:ext uri="{0D108BD9-81ED-4DB2-BD59-A6C34878D82A}">
+                    <a16:rowId xmlns:a16="http://schemas.microsoft.com/office/drawing/2014/main" val="3967578678"/>
+                  </a:ext>
+                </a:extLst>
+              </a:tr>
+              <a:tr h="548296">
+                <a:tc>
+                  <a:txBody>
+                    <a:bodyPr/>
+                    <a:lstStyle/>
+                    <a:p>
+                      <a:r>
+                        <a:rPr lang="en-US" sz="1700">
+                          <a:effectLst/>
+                        </a:rPr>
+                        <a:t>Monday</a:t>
+                      </a:r>
+                    </a:p>
+                  </a:txBody>
+                  <a:tcPr marL="15681" marR="15681" marT="15681" marB="15681" anchor="ctr">
+                    <a:lnL w="6350" cap="flat" cmpd="sng" algn="ctr">
+                      <a:solidFill>
+                        <a:srgbClr val="E0E0E0"/>
+                      </a:solidFill>
+                      <a:prstDash val="solid"/>
+                      <a:round/>
+                      <a:headEnd type="none" w="med" len="med"/>
+                      <a:tailEnd type="none" w="med" len="med"/>
+                    </a:lnL>
+                    <a:lnR w="6350" cap="flat" cmpd="sng" algn="ctr">
+                      <a:solidFill>
+                        <a:srgbClr val="E0E0E0"/>
+                      </a:solidFill>
+                      <a:prstDash val="solid"/>
+                      <a:round/>
+                      <a:headEnd type="none" w="med" len="med"/>
+                      <a:tailEnd type="none" w="med" len="med"/>
+                    </a:lnR>
+                    <a:lnT w="6350" cap="flat" cmpd="sng" algn="ctr">
+                      <a:solidFill>
+                        <a:srgbClr val="E0E0E0"/>
+                      </a:solidFill>
+                      <a:prstDash val="solid"/>
+                      <a:round/>
+                      <a:headEnd type="none" w="med" len="med"/>
+                      <a:tailEnd type="none" w="med" len="med"/>
+                    </a:lnT>
+                    <a:lnB w="6350" cap="flat" cmpd="sng" algn="ctr">
+                      <a:solidFill>
+                        <a:srgbClr val="E0E0E0"/>
+                      </a:solidFill>
+                      <a:prstDash val="solid"/>
+                      <a:round/>
+                      <a:headEnd type="none" w="med" len="med"/>
+                      <a:tailEnd type="none" w="med" len="med"/>
+                    </a:lnB>
+                    <a:solidFill>
+                      <a:srgbClr val="FFFFFF"/>
+                    </a:solidFill>
+                  </a:tcPr>
+                </a:tc>
+                <a:tc>
+                  <a:txBody>
+                    <a:bodyPr/>
+                    <a:lstStyle/>
+                    <a:p>
+                      <a:r>
+                        <a:rPr lang="en-US" sz="1700">
+                          <a:effectLst/>
+                        </a:rPr>
+                        <a:t>12 PM - 2 PM : CSB 120</a:t>
+                      </a:r>
+                    </a:p>
+                  </a:txBody>
+                  <a:tcPr marL="15681" marR="15681" marT="15681" marB="15681" anchor="ctr">
+                    <a:lnL w="6350" cap="flat" cmpd="sng" algn="ctr">
+                      <a:solidFill>
+                        <a:srgbClr val="E0E0E0"/>
+                      </a:solidFill>
+                      <a:prstDash val="solid"/>
+                      <a:round/>
+                      <a:headEnd type="none" w="med" len="med"/>
+                      <a:tailEnd type="none" w="med" len="med"/>
+                    </a:lnL>
+                    <a:lnR w="6350" cap="flat" cmpd="sng" algn="ctr">
+                      <a:solidFill>
+                        <a:srgbClr val="E0E0E0"/>
+                      </a:solidFill>
+                      <a:prstDash val="solid"/>
+                      <a:round/>
+                      <a:headEnd type="none" w="med" len="med"/>
+                      <a:tailEnd type="none" w="med" len="med"/>
+                    </a:lnR>
+                    <a:lnT w="6350" cap="flat" cmpd="sng" algn="ctr">
+                      <a:solidFill>
+                        <a:srgbClr val="E0E0E0"/>
+                      </a:solidFill>
+                      <a:prstDash val="solid"/>
+                      <a:round/>
+                      <a:headEnd type="none" w="med" len="med"/>
+                      <a:tailEnd type="none" w="med" len="med"/>
+                    </a:lnT>
+                    <a:lnB w="6350" cap="flat" cmpd="sng" algn="ctr">
+                      <a:solidFill>
+                        <a:srgbClr val="E0E0E0"/>
+                      </a:solidFill>
+                      <a:prstDash val="solid"/>
+                      <a:round/>
+                      <a:headEnd type="none" w="med" len="med"/>
+                      <a:tailEnd type="none" w="med" len="med"/>
+                    </a:lnB>
+                    <a:solidFill>
+                      <a:srgbClr val="FFFFFF"/>
+                    </a:solidFill>
+                  </a:tcPr>
+                </a:tc>
+                <a:extLst>
+                  <a:ext uri="{0D108BD9-81ED-4DB2-BD59-A6C34878D82A}">
+                    <a16:rowId xmlns:a16="http://schemas.microsoft.com/office/drawing/2014/main" val="4272848274"/>
+                  </a:ext>
+                </a:extLst>
+              </a:tr>
+              <a:tr h="289830">
+                <a:tc>
+                  <a:txBody>
+                    <a:bodyPr/>
+                    <a:lstStyle/>
+                    <a:p>
+                      <a:r>
+                        <a:rPr lang="en-US" sz="1700">
+                          <a:effectLst/>
+                        </a:rPr>
+                        <a:t>Tuesday</a:t>
+                      </a:r>
+                    </a:p>
+                  </a:txBody>
+                  <a:tcPr marL="15681" marR="15681" marT="15681" marB="15681" anchor="ctr">
+                    <a:lnL w="6350" cap="flat" cmpd="sng" algn="ctr">
+                      <a:solidFill>
+                        <a:srgbClr val="E0E0E0"/>
+                      </a:solidFill>
+                      <a:prstDash val="solid"/>
+                      <a:round/>
+                      <a:headEnd type="none" w="med" len="med"/>
+                      <a:tailEnd type="none" w="med" len="med"/>
+                    </a:lnL>
+                    <a:lnR w="6350" cap="flat" cmpd="sng" algn="ctr">
+                      <a:solidFill>
+                        <a:srgbClr val="E0E0E0"/>
+                      </a:solidFill>
+                      <a:prstDash val="solid"/>
+                      <a:round/>
+                      <a:headEnd type="none" w="med" len="med"/>
+                      <a:tailEnd type="none" w="med" len="med"/>
+                    </a:lnR>
+                    <a:lnT w="6350" cap="flat" cmpd="sng" algn="ctr">
+                      <a:solidFill>
+                        <a:srgbClr val="E0E0E0"/>
+                      </a:solidFill>
+                      <a:prstDash val="solid"/>
+                      <a:round/>
+                      <a:headEnd type="none" w="med" len="med"/>
+                      <a:tailEnd type="none" w="med" len="med"/>
+                    </a:lnT>
+                    <a:lnB w="6350" cap="flat" cmpd="sng" algn="ctr">
+                      <a:solidFill>
+                        <a:srgbClr val="E0E0E0"/>
+                      </a:solidFill>
+                      <a:prstDash val="solid"/>
+                      <a:round/>
+                      <a:headEnd type="none" w="med" len="med"/>
+                      <a:tailEnd type="none" w="med" len="med"/>
+                    </a:lnB>
+                    <a:solidFill>
+                      <a:srgbClr val="FFFFFF"/>
+                    </a:solidFill>
+                  </a:tcPr>
+                </a:tc>
+                <a:tc>
+                  <a:txBody>
+                    <a:bodyPr/>
+                    <a:lstStyle/>
+                    <a:p>
+                      <a:r>
+                        <a:rPr lang="en-US" sz="1700">
+                          <a:effectLst/>
+                        </a:rPr>
+                        <a:t>6 PM - 8 PM : Teams</a:t>
+                      </a:r>
+                    </a:p>
+                  </a:txBody>
+                  <a:tcPr marL="15681" marR="15681" marT="15681" marB="15681" anchor="ctr">
+                    <a:lnL w="6350" cap="flat" cmpd="sng" algn="ctr">
+                      <a:solidFill>
+                        <a:srgbClr val="E0E0E0"/>
+                      </a:solidFill>
+                      <a:prstDash val="solid"/>
+                      <a:round/>
+                      <a:headEnd type="none" w="med" len="med"/>
+                      <a:tailEnd type="none" w="med" len="med"/>
+                    </a:lnL>
+                    <a:lnR w="6350" cap="flat" cmpd="sng" algn="ctr">
+                      <a:solidFill>
+                        <a:srgbClr val="E0E0E0"/>
+                      </a:solidFill>
+                      <a:prstDash val="solid"/>
+                      <a:round/>
+                      <a:headEnd type="none" w="med" len="med"/>
+                      <a:tailEnd type="none" w="med" len="med"/>
+                    </a:lnR>
+                    <a:lnT w="6350" cap="flat" cmpd="sng" algn="ctr">
+                      <a:solidFill>
+                        <a:srgbClr val="E0E0E0"/>
+                      </a:solidFill>
+                      <a:prstDash val="solid"/>
+                      <a:round/>
+                      <a:headEnd type="none" w="med" len="med"/>
+                      <a:tailEnd type="none" w="med" len="med"/>
+                    </a:lnT>
+                    <a:lnB w="6350" cap="flat" cmpd="sng" algn="ctr">
+                      <a:solidFill>
+                        <a:srgbClr val="E0E0E0"/>
+                      </a:solidFill>
+                      <a:prstDash val="solid"/>
+                      <a:round/>
+                      <a:headEnd type="none" w="med" len="med"/>
+                      <a:tailEnd type="none" w="med" len="med"/>
+                    </a:lnB>
+                    <a:solidFill>
+                      <a:srgbClr val="FFFFFF"/>
+                    </a:solidFill>
+                  </a:tcPr>
+                </a:tc>
+                <a:extLst>
+                  <a:ext uri="{0D108BD9-81ED-4DB2-BD59-A6C34878D82A}">
+                    <a16:rowId xmlns:a16="http://schemas.microsoft.com/office/drawing/2014/main" val="369786881"/>
+                  </a:ext>
+                </a:extLst>
+              </a:tr>
+              <a:tr h="548296">
+                <a:tc>
+                  <a:txBody>
+                    <a:bodyPr/>
+                    <a:lstStyle/>
+                    <a:p>
+                      <a:r>
+                        <a:rPr lang="en-US" sz="1700">
+                          <a:effectLst/>
+                        </a:rPr>
+                        <a:t>Wednesday</a:t>
+                      </a:r>
+                    </a:p>
+                  </a:txBody>
+                  <a:tcPr marL="15681" marR="15681" marT="15681" marB="15681" anchor="ctr">
+                    <a:lnL w="6350" cap="flat" cmpd="sng" algn="ctr">
+                      <a:solidFill>
+                        <a:srgbClr val="E0E0E0"/>
+                      </a:solidFill>
+                      <a:prstDash val="solid"/>
+                      <a:round/>
+                      <a:headEnd type="none" w="med" len="med"/>
+                      <a:tailEnd type="none" w="med" len="med"/>
+                    </a:lnL>
+                    <a:lnR w="6350" cap="flat" cmpd="sng" algn="ctr">
+                      <a:solidFill>
+                        <a:srgbClr val="E0E0E0"/>
+                      </a:solidFill>
+                      <a:prstDash val="solid"/>
+                      <a:round/>
+                      <a:headEnd type="none" w="med" len="med"/>
+                      <a:tailEnd type="none" w="med" len="med"/>
+                    </a:lnR>
+                    <a:lnT w="6350" cap="flat" cmpd="sng" algn="ctr">
+                      <a:solidFill>
+                        <a:srgbClr val="E0E0E0"/>
+                      </a:solidFill>
+                      <a:prstDash val="solid"/>
+                      <a:round/>
+                      <a:headEnd type="none" w="med" len="med"/>
+                      <a:tailEnd type="none" w="med" len="med"/>
+                    </a:lnT>
+                    <a:lnB w="6350" cap="flat" cmpd="sng" algn="ctr">
+                      <a:solidFill>
+                        <a:srgbClr val="E0E0E0"/>
+                      </a:solidFill>
+                      <a:prstDash val="solid"/>
+                      <a:round/>
+                      <a:headEnd type="none" w="med" len="med"/>
+                      <a:tailEnd type="none" w="med" len="med"/>
+                    </a:lnB>
+                    <a:solidFill>
+                      <a:srgbClr val="FFFFFF"/>
+                    </a:solidFill>
+                  </a:tcPr>
+                </a:tc>
+                <a:tc>
+                  <a:txBody>
+                    <a:bodyPr/>
+                    <a:lstStyle/>
+                    <a:p>
+                      <a:r>
+                        <a:rPr lang="en-US" sz="1700">
+                          <a:effectLst/>
+                        </a:rPr>
+                        <a:t>3 PM - 5 PM : CSB 120</a:t>
+                      </a:r>
+                    </a:p>
+                  </a:txBody>
+                  <a:tcPr marL="15681" marR="15681" marT="15681" marB="15681" anchor="ctr">
+                    <a:lnL w="6350" cap="flat" cmpd="sng" algn="ctr">
+                      <a:solidFill>
+                        <a:srgbClr val="E0E0E0"/>
+                      </a:solidFill>
+                      <a:prstDash val="solid"/>
+                      <a:round/>
+                      <a:headEnd type="none" w="med" len="med"/>
+                      <a:tailEnd type="none" w="med" len="med"/>
+                    </a:lnL>
+                    <a:lnR w="6350" cap="flat" cmpd="sng" algn="ctr">
+                      <a:solidFill>
+                        <a:srgbClr val="E0E0E0"/>
+                      </a:solidFill>
+                      <a:prstDash val="solid"/>
+                      <a:round/>
+                      <a:headEnd type="none" w="med" len="med"/>
+                      <a:tailEnd type="none" w="med" len="med"/>
+                    </a:lnR>
+                    <a:lnT w="6350" cap="flat" cmpd="sng" algn="ctr">
+                      <a:solidFill>
+                        <a:srgbClr val="E0E0E0"/>
+                      </a:solidFill>
+                      <a:prstDash val="solid"/>
+                      <a:round/>
+                      <a:headEnd type="none" w="med" len="med"/>
+                      <a:tailEnd type="none" w="med" len="med"/>
+                    </a:lnT>
+                    <a:lnB w="6350" cap="flat" cmpd="sng" algn="ctr">
+                      <a:solidFill>
+                        <a:srgbClr val="E0E0E0"/>
+                      </a:solidFill>
+                      <a:prstDash val="solid"/>
+                      <a:round/>
+                      <a:headEnd type="none" w="med" len="med"/>
+                      <a:tailEnd type="none" w="med" len="med"/>
+                    </a:lnB>
+                    <a:solidFill>
+                      <a:srgbClr val="FFFFFF"/>
+                    </a:solidFill>
+                  </a:tcPr>
+                </a:tc>
+                <a:extLst>
+                  <a:ext uri="{0D108BD9-81ED-4DB2-BD59-A6C34878D82A}">
+                    <a16:rowId xmlns:a16="http://schemas.microsoft.com/office/drawing/2014/main" val="252902362"/>
+                  </a:ext>
+                </a:extLst>
+              </a:tr>
+              <a:tr h="289830">
+                <a:tc>
+                  <a:txBody>
+                    <a:bodyPr/>
+                    <a:lstStyle/>
+                    <a:p>
+                      <a:r>
+                        <a:rPr lang="en-US" sz="1700">
+                          <a:effectLst/>
+                        </a:rPr>
+                        <a:t>Thursday</a:t>
+                      </a:r>
+                    </a:p>
+                  </a:txBody>
+                  <a:tcPr marL="15681" marR="15681" marT="15681" marB="15681" anchor="ctr">
+                    <a:lnL w="6350" cap="flat" cmpd="sng" algn="ctr">
+                      <a:solidFill>
+                        <a:srgbClr val="E0E0E0"/>
+                      </a:solidFill>
+                      <a:prstDash val="solid"/>
+                      <a:round/>
+                      <a:headEnd type="none" w="med" len="med"/>
+                      <a:tailEnd type="none" w="med" len="med"/>
+                    </a:lnL>
+                    <a:lnR w="6350" cap="flat" cmpd="sng" algn="ctr">
+                      <a:solidFill>
+                        <a:srgbClr val="E0E0E0"/>
+                      </a:solidFill>
+                      <a:prstDash val="solid"/>
+                      <a:round/>
+                      <a:headEnd type="none" w="med" len="med"/>
+                      <a:tailEnd type="none" w="med" len="med"/>
+                    </a:lnR>
+                    <a:lnT w="6350" cap="flat" cmpd="sng" algn="ctr">
+                      <a:solidFill>
+                        <a:srgbClr val="E0E0E0"/>
+                      </a:solidFill>
+                      <a:prstDash val="solid"/>
+                      <a:round/>
+                      <a:headEnd type="none" w="med" len="med"/>
+                      <a:tailEnd type="none" w="med" len="med"/>
+                    </a:lnT>
+                    <a:lnB w="6350" cap="flat" cmpd="sng" algn="ctr">
+                      <a:solidFill>
+                        <a:srgbClr val="E0E0E0"/>
+                      </a:solidFill>
+                      <a:prstDash val="solid"/>
+                      <a:round/>
+                      <a:headEnd type="none" w="med" len="med"/>
+                      <a:tailEnd type="none" w="med" len="med"/>
+                    </a:lnB>
+                    <a:solidFill>
+                      <a:srgbClr val="FFFFFF"/>
+                    </a:solidFill>
+                  </a:tcPr>
+                </a:tc>
+                <a:tc>
+                  <a:txBody>
+                    <a:bodyPr/>
+                    <a:lstStyle/>
+                    <a:p>
+                      <a:r>
+                        <a:rPr lang="en-US" sz="1700">
+                          <a:effectLst/>
+                        </a:rPr>
+                        <a:t>6 PM - 8 PM : Teams</a:t>
+                      </a:r>
+                    </a:p>
+                  </a:txBody>
+                  <a:tcPr marL="15681" marR="15681" marT="15681" marB="15681" anchor="ctr">
+                    <a:lnL w="6350" cap="flat" cmpd="sng" algn="ctr">
+                      <a:solidFill>
+                        <a:srgbClr val="E0E0E0"/>
+                      </a:solidFill>
+                      <a:prstDash val="solid"/>
+                      <a:round/>
+                      <a:headEnd type="none" w="med" len="med"/>
+                      <a:tailEnd type="none" w="med" len="med"/>
+                    </a:lnL>
+                    <a:lnR w="6350" cap="flat" cmpd="sng" algn="ctr">
+                      <a:solidFill>
+                        <a:srgbClr val="E0E0E0"/>
+                      </a:solidFill>
+                      <a:prstDash val="solid"/>
+                      <a:round/>
+                      <a:headEnd type="none" w="med" len="med"/>
+                      <a:tailEnd type="none" w="med" len="med"/>
+                    </a:lnR>
+                    <a:lnT w="6350" cap="flat" cmpd="sng" algn="ctr">
+                      <a:solidFill>
+                        <a:srgbClr val="E0E0E0"/>
+                      </a:solidFill>
+                      <a:prstDash val="solid"/>
+                      <a:round/>
+                      <a:headEnd type="none" w="med" len="med"/>
+                      <a:tailEnd type="none" w="med" len="med"/>
+                    </a:lnT>
+                    <a:lnB w="6350" cap="flat" cmpd="sng" algn="ctr">
+                      <a:solidFill>
+                        <a:srgbClr val="E0E0E0"/>
+                      </a:solidFill>
+                      <a:prstDash val="solid"/>
+                      <a:round/>
+                      <a:headEnd type="none" w="med" len="med"/>
+                      <a:tailEnd type="none" w="med" len="med"/>
+                    </a:lnB>
+                    <a:solidFill>
+                      <a:srgbClr val="FFFFFF"/>
+                    </a:solidFill>
+                  </a:tcPr>
+                </a:tc>
+                <a:extLst>
+                  <a:ext uri="{0D108BD9-81ED-4DB2-BD59-A6C34878D82A}">
+                    <a16:rowId xmlns:a16="http://schemas.microsoft.com/office/drawing/2014/main" val="2125508035"/>
+                  </a:ext>
+                </a:extLst>
+              </a:tr>
+              <a:tr h="548296">
+                <a:tc>
+                  <a:txBody>
+                    <a:bodyPr/>
+                    <a:lstStyle/>
+                    <a:p>
+                      <a:r>
+                        <a:rPr lang="en-US" sz="1700">
+                          <a:effectLst/>
+                        </a:rPr>
+                        <a:t>Friday</a:t>
+                      </a:r>
+                    </a:p>
+                  </a:txBody>
+                  <a:tcPr marL="15681" marR="15681" marT="15681" marB="15681" anchor="ctr">
+                    <a:lnL w="6350" cap="flat" cmpd="sng" algn="ctr">
+                      <a:solidFill>
+                        <a:srgbClr val="E0E0E0"/>
+                      </a:solidFill>
+                      <a:prstDash val="solid"/>
+                      <a:round/>
+                      <a:headEnd type="none" w="med" len="med"/>
+                      <a:tailEnd type="none" w="med" len="med"/>
+                    </a:lnL>
+                    <a:lnR w="6350" cap="flat" cmpd="sng" algn="ctr">
+                      <a:solidFill>
+                        <a:srgbClr val="E0E0E0"/>
+                      </a:solidFill>
+                      <a:prstDash val="solid"/>
+                      <a:round/>
+                      <a:headEnd type="none" w="med" len="med"/>
+                      <a:tailEnd type="none" w="med" len="med"/>
+                    </a:lnR>
+                    <a:lnT w="6350" cap="flat" cmpd="sng" algn="ctr">
+                      <a:solidFill>
+                        <a:srgbClr val="E0E0E0"/>
+                      </a:solidFill>
+                      <a:prstDash val="solid"/>
+                      <a:round/>
+                      <a:headEnd type="none" w="med" len="med"/>
+                      <a:tailEnd type="none" w="med" len="med"/>
+                    </a:lnT>
+                    <a:lnB w="6350" cap="flat" cmpd="sng" algn="ctr">
+                      <a:solidFill>
+                        <a:srgbClr val="E0E0E0"/>
+                      </a:solidFill>
+                      <a:prstDash val="solid"/>
+                      <a:round/>
+                      <a:headEnd type="none" w="med" len="med"/>
+                      <a:tailEnd type="none" w="med" len="med"/>
+                    </a:lnB>
+                    <a:solidFill>
+                      <a:srgbClr val="FFFFFF"/>
+                    </a:solidFill>
+                  </a:tcPr>
+                </a:tc>
+                <a:tc>
+                  <a:txBody>
+                    <a:bodyPr/>
+                    <a:lstStyle/>
+                    <a:p>
+                      <a:r>
+                        <a:rPr lang="en-US" sz="1700">
+                          <a:effectLst/>
+                        </a:rPr>
+                        <a:t>3 PM - 5 PM : CSB 120</a:t>
+                      </a:r>
+                    </a:p>
+                  </a:txBody>
+                  <a:tcPr marL="15681" marR="15681" marT="15681" marB="15681" anchor="ctr">
+                    <a:lnL w="6350" cap="flat" cmpd="sng" algn="ctr">
+                      <a:solidFill>
+                        <a:srgbClr val="E0E0E0"/>
+                      </a:solidFill>
+                      <a:prstDash val="solid"/>
+                      <a:round/>
+                      <a:headEnd type="none" w="med" len="med"/>
+                      <a:tailEnd type="none" w="med" len="med"/>
+                    </a:lnL>
+                    <a:lnR w="6350" cap="flat" cmpd="sng" algn="ctr">
+                      <a:solidFill>
+                        <a:srgbClr val="E0E0E0"/>
+                      </a:solidFill>
+                      <a:prstDash val="solid"/>
+                      <a:round/>
+                      <a:headEnd type="none" w="med" len="med"/>
+                      <a:tailEnd type="none" w="med" len="med"/>
+                    </a:lnR>
+                    <a:lnT w="6350" cap="flat" cmpd="sng" algn="ctr">
+                      <a:solidFill>
+                        <a:srgbClr val="E0E0E0"/>
+                      </a:solidFill>
+                      <a:prstDash val="solid"/>
+                      <a:round/>
+                      <a:headEnd type="none" w="med" len="med"/>
+                      <a:tailEnd type="none" w="med" len="med"/>
+                    </a:lnT>
+                    <a:lnB w="6350" cap="flat" cmpd="sng" algn="ctr">
+                      <a:solidFill>
+                        <a:srgbClr val="E0E0E0"/>
+                      </a:solidFill>
+                      <a:prstDash val="solid"/>
+                      <a:round/>
+                      <a:headEnd type="none" w="med" len="med"/>
+                      <a:tailEnd type="none" w="med" len="med"/>
+                    </a:lnB>
+                    <a:solidFill>
+                      <a:srgbClr val="FFFFFF"/>
+                    </a:solidFill>
+                  </a:tcPr>
+                </a:tc>
+                <a:extLst>
+                  <a:ext uri="{0D108BD9-81ED-4DB2-BD59-A6C34878D82A}">
+                    <a16:rowId xmlns:a16="http://schemas.microsoft.com/office/drawing/2014/main" val="772220127"/>
+                  </a:ext>
+                </a:extLst>
+              </a:tr>
+              <a:tr h="289830">
+                <a:tc>
+                  <a:txBody>
+                    <a:bodyPr/>
+                    <a:lstStyle/>
+                    <a:p>
+                      <a:r>
+                        <a:rPr lang="en-US" sz="1700">
+                          <a:effectLst/>
+                        </a:rPr>
+                        <a:t>Saturday</a:t>
+                      </a:r>
+                    </a:p>
+                  </a:txBody>
+                  <a:tcPr marL="15681" marR="15681" marT="15681" marB="15681" anchor="ctr">
+                    <a:lnL w="6350" cap="flat" cmpd="sng" algn="ctr">
+                      <a:solidFill>
+                        <a:srgbClr val="E0E0E0"/>
+                      </a:solidFill>
+                      <a:prstDash val="solid"/>
+                      <a:round/>
+                      <a:headEnd type="none" w="med" len="med"/>
+                      <a:tailEnd type="none" w="med" len="med"/>
+                    </a:lnL>
+                    <a:lnR w="6350" cap="flat" cmpd="sng" algn="ctr">
+                      <a:solidFill>
+                        <a:srgbClr val="E0E0E0"/>
+                      </a:solidFill>
+                      <a:prstDash val="solid"/>
+                      <a:round/>
+                      <a:headEnd type="none" w="med" len="med"/>
+                      <a:tailEnd type="none" w="med" len="med"/>
+                    </a:lnR>
+                    <a:lnT w="6350" cap="flat" cmpd="sng" algn="ctr">
+                      <a:solidFill>
+                        <a:srgbClr val="E0E0E0"/>
+                      </a:solidFill>
+                      <a:prstDash val="solid"/>
+                      <a:round/>
+                      <a:headEnd type="none" w="med" len="med"/>
+                      <a:tailEnd type="none" w="med" len="med"/>
+                    </a:lnT>
+                    <a:lnB w="6350" cap="flat" cmpd="sng" algn="ctr">
+                      <a:solidFill>
+                        <a:srgbClr val="E0E0E0"/>
+                      </a:solidFill>
+                      <a:prstDash val="solid"/>
+                      <a:round/>
+                      <a:headEnd type="none" w="med" len="med"/>
+                      <a:tailEnd type="none" w="med" len="med"/>
+                    </a:lnB>
+                    <a:solidFill>
+                      <a:srgbClr val="FFFFFF"/>
+                    </a:solidFill>
+                  </a:tcPr>
+                </a:tc>
+                <a:tc>
+                  <a:txBody>
+                    <a:bodyPr/>
+                    <a:lstStyle/>
+                    <a:p>
+                      <a:r>
+                        <a:rPr lang="en-US" sz="1700">
+                          <a:effectLst/>
+                        </a:rPr>
+                        <a:t>12 PM - 4 PM : Teams</a:t>
+                      </a:r>
+                    </a:p>
+                  </a:txBody>
+                  <a:tcPr marL="15681" marR="15681" marT="15681" marB="15681" anchor="ctr">
+                    <a:lnL w="6350" cap="flat" cmpd="sng" algn="ctr">
+                      <a:solidFill>
+                        <a:srgbClr val="E0E0E0"/>
+                      </a:solidFill>
+                      <a:prstDash val="solid"/>
+                      <a:round/>
+                      <a:headEnd type="none" w="med" len="med"/>
+                      <a:tailEnd type="none" w="med" len="med"/>
+                    </a:lnL>
+                    <a:lnR w="6350" cap="flat" cmpd="sng" algn="ctr">
+                      <a:solidFill>
+                        <a:srgbClr val="E0E0E0"/>
+                      </a:solidFill>
+                      <a:prstDash val="solid"/>
+                      <a:round/>
+                      <a:headEnd type="none" w="med" len="med"/>
+                      <a:tailEnd type="none" w="med" len="med"/>
+                    </a:lnR>
+                    <a:lnT w="6350" cap="flat" cmpd="sng" algn="ctr">
+                      <a:solidFill>
+                        <a:srgbClr val="E0E0E0"/>
+                      </a:solidFill>
+                      <a:prstDash val="solid"/>
+                      <a:round/>
+                      <a:headEnd type="none" w="med" len="med"/>
+                      <a:tailEnd type="none" w="med" len="med"/>
+                    </a:lnT>
+                    <a:lnB w="6350" cap="flat" cmpd="sng" algn="ctr">
+                      <a:solidFill>
+                        <a:srgbClr val="E0E0E0"/>
+                      </a:solidFill>
+                      <a:prstDash val="solid"/>
+                      <a:round/>
+                      <a:headEnd type="none" w="med" len="med"/>
+                      <a:tailEnd type="none" w="med" len="med"/>
+                    </a:lnB>
+                    <a:solidFill>
+                      <a:srgbClr val="FFFFFF"/>
+                    </a:solidFill>
+                  </a:tcPr>
+                </a:tc>
+                <a:extLst>
+                  <a:ext uri="{0D108BD9-81ED-4DB2-BD59-A6C34878D82A}">
+                    <a16:rowId xmlns:a16="http://schemas.microsoft.com/office/drawing/2014/main" val="3754499503"/>
+                  </a:ext>
+                </a:extLst>
+              </a:tr>
+              <a:tr h="289830">
+                <a:tc>
+                  <a:txBody>
+                    <a:bodyPr/>
+                    <a:lstStyle/>
+                    <a:p>
+                      <a:r>
+                        <a:rPr lang="en-US" sz="1700">
+                          <a:effectLst/>
+                        </a:rPr>
+                        <a:t>Sunday</a:t>
+                      </a:r>
+                    </a:p>
+                  </a:txBody>
+                  <a:tcPr marL="15681" marR="15681" marT="15681" marB="15681" anchor="ctr">
+                    <a:lnL w="6350" cap="flat" cmpd="sng" algn="ctr">
+                      <a:solidFill>
+                        <a:srgbClr val="E0E0E0"/>
+                      </a:solidFill>
+                      <a:prstDash val="solid"/>
+                      <a:round/>
+                      <a:headEnd type="none" w="med" len="med"/>
+                      <a:tailEnd type="none" w="med" len="med"/>
+                    </a:lnL>
+                    <a:lnR w="6350" cap="flat" cmpd="sng" algn="ctr">
+                      <a:solidFill>
+                        <a:srgbClr val="E0E0E0"/>
+                      </a:solidFill>
+                      <a:prstDash val="solid"/>
+                      <a:round/>
+                      <a:headEnd type="none" w="med" len="med"/>
+                      <a:tailEnd type="none" w="med" len="med"/>
+                    </a:lnR>
+                    <a:lnT w="6350" cap="flat" cmpd="sng" algn="ctr">
+                      <a:solidFill>
+                        <a:srgbClr val="E0E0E0"/>
+                      </a:solidFill>
+                      <a:prstDash val="solid"/>
+                      <a:round/>
+                      <a:headEnd type="none" w="med" len="med"/>
+                      <a:tailEnd type="none" w="med" len="med"/>
+                    </a:lnT>
+                    <a:lnB w="6350" cap="flat" cmpd="sng" algn="ctr">
+                      <a:solidFill>
+                        <a:srgbClr val="E0E0E0"/>
+                      </a:solidFill>
+                      <a:prstDash val="solid"/>
+                      <a:round/>
+                      <a:headEnd type="none" w="med" len="med"/>
+                      <a:tailEnd type="none" w="med" len="med"/>
+                    </a:lnB>
+                    <a:solidFill>
+                      <a:srgbClr val="FFFFFF"/>
+                    </a:solidFill>
+                  </a:tcPr>
+                </a:tc>
+                <a:tc>
+                  <a:txBody>
+                    <a:bodyPr/>
+                    <a:lstStyle/>
+                    <a:p>
+                      <a:r>
+                        <a:rPr lang="en-US" sz="1700" dirty="0">
+                          <a:effectLst/>
+                        </a:rPr>
+                        <a:t>12 PM - 4 PM : Teams</a:t>
+                      </a:r>
+                    </a:p>
+                  </a:txBody>
+                  <a:tcPr marL="15681" marR="15681" marT="15681" marB="15681" anchor="ctr">
+                    <a:lnL w="6350" cap="flat" cmpd="sng" algn="ctr">
+                      <a:solidFill>
+                        <a:srgbClr val="E0E0E0"/>
+                      </a:solidFill>
+                      <a:prstDash val="solid"/>
+                      <a:round/>
+                      <a:headEnd type="none" w="med" len="med"/>
+                      <a:tailEnd type="none" w="med" len="med"/>
+                    </a:lnL>
+                    <a:lnR w="6350" cap="flat" cmpd="sng" algn="ctr">
+                      <a:solidFill>
+                        <a:srgbClr val="E0E0E0"/>
+                      </a:solidFill>
+                      <a:prstDash val="solid"/>
+                      <a:round/>
+                      <a:headEnd type="none" w="med" len="med"/>
+                      <a:tailEnd type="none" w="med" len="med"/>
+                    </a:lnR>
+                    <a:lnT w="6350" cap="flat" cmpd="sng" algn="ctr">
+                      <a:solidFill>
+                        <a:srgbClr val="E0E0E0"/>
+                      </a:solidFill>
+                      <a:prstDash val="solid"/>
+                      <a:round/>
+                      <a:headEnd type="none" w="med" len="med"/>
+                      <a:tailEnd type="none" w="med" len="med"/>
+                    </a:lnT>
+                    <a:lnB w="6350" cap="flat" cmpd="sng" algn="ctr">
+                      <a:solidFill>
+                        <a:srgbClr val="E0E0E0"/>
+                      </a:solidFill>
+                      <a:prstDash val="solid"/>
+                      <a:round/>
+                      <a:headEnd type="none" w="med" len="med"/>
+                      <a:tailEnd type="none" w="med" len="med"/>
+                    </a:lnB>
+                    <a:solidFill>
+                      <a:srgbClr val="FFFFFF"/>
+                    </a:solidFill>
+                  </a:tcPr>
+                </a:tc>
+                <a:extLst>
+                  <a:ext uri="{0D108BD9-81ED-4DB2-BD59-A6C34878D82A}">
+                    <a16:rowId xmlns:a16="http://schemas.microsoft.com/office/drawing/2014/main" val="1778919050"/>
+                  </a:ext>
+                </a:extLst>
+              </a:tr>
+            </a:tbl>
+          </a:graphicData>
+        </a:graphic>
+      </p:graphicFrame>
+      <p:sp>
+        <p:nvSpPr>
+          <p:cNvPr id="8" name="TextBox 7">
+            <a:extLst>
+              <a:ext uri="{FF2B5EF4-FFF2-40B4-BE49-F238E27FC236}">
+                <a16:creationId xmlns:a16="http://schemas.microsoft.com/office/drawing/2014/main" id="{693D57F6-9630-4076-8528-D9DA6F942571}"/>
+              </a:ext>
+            </a:extLst>
+          </p:cNvPr>
+          <p:cNvSpPr txBox="1"/>
+          <p:nvPr/>
+        </p:nvSpPr>
+        <p:spPr>
+          <a:xfrm flipH="1">
+            <a:off x="10025176" y="3563577"/>
+            <a:ext cx="2444933" cy="400110"/>
+          </a:xfrm>
+          <a:prstGeom prst="rect">
+            <a:avLst/>
+          </a:prstGeom>
+          <a:noFill/>
+        </p:spPr>
+        <p:txBody>
+          <a:bodyPr wrap="square" rtlCol="0">
+            <a:spAutoFit/>
+          </a:bodyPr>
+          <a:lstStyle/>
+          <a:p>
+            <a:r>
+              <a:rPr lang="en-US" dirty="0"/>
+              <a:t>Help Desk</a:t>
+            </a:r>
+          </a:p>
+        </p:txBody>
+      </p:sp>
     </p:spTree>
     <p:extLst>
       <p:ext uri="{BB962C8B-B14F-4D97-AF65-F5344CB8AC3E}">
@@ -26765,12 +27112,21 @@
         <p:spPr>
           <a:xfrm>
             <a:off x="410359" y="1891134"/>
-            <a:ext cx="12659425" cy="1631537"/>
+            <a:ext cx="12659425" cy="3268908"/>
           </a:xfrm>
         </p:spPr>
         <p:txBody>
           <a:bodyPr/>
           <a:lstStyle/>
+          <a:p>
+            <a:r>
+              <a:rPr lang="en-US" sz="2400" b="1" dirty="0"/>
+              <a:t>Grab a paper, write your name, as it is in Canvas, and your answers to the following questions. Turn this as your attendance for today’s lecture.</a:t>
+            </a:r>
+          </a:p>
+          <a:p>
+            <a:endParaRPr lang="en-US" sz="2400" dirty="0"/>
+          </a:p>
           <a:p>
             <a:r>
               <a:rPr lang="en-US" sz="2400" dirty="0"/>
@@ -37748,16 +38104,16 @@
 <file path=customXml/itemProps3.xml><?xml version="1.0" encoding="utf-8"?>
 <ds:datastoreItem xmlns:ds="http://schemas.openxmlformats.org/officeDocument/2006/customXml" ds:itemID="{9423A8D4-FAC8-4B50-A3C8-807432B3C479}">
   <ds:schemaRefs>
+    <ds:schemaRef ds:uri="http://www.w3.org/XML/1998/namespace"/>
+    <ds:schemaRef ds:uri="http://purl.org/dc/terms/"/>
+    <ds:schemaRef ds:uri="http://schemas.microsoft.com/office/2006/documentManagement/types"/>
+    <ds:schemaRef ds:uri="http://schemas.microsoft.com/office/2006/metadata/properties"/>
+    <ds:schemaRef ds:uri="e06ed288-fd75-4b50-bbed-f5a5df88c31c"/>
     <ds:schemaRef ds:uri="92c41bee-f0ee-4aa6-9399-a35fbb883510"/>
-    <ds:schemaRef ds:uri="http://schemas.microsoft.com/office/2006/documentManagement/types"/>
+    <ds:schemaRef ds:uri="http://schemas.microsoft.com/office/infopath/2007/PartnerControls"/>
+    <ds:schemaRef ds:uri="http://purl.org/dc/elements/1.1/"/>
     <ds:schemaRef ds:uri="http://purl.org/dc/dcmitype/"/>
-    <ds:schemaRef ds:uri="http://schemas.microsoft.com/office/2006/metadata/properties"/>
-    <ds:schemaRef ds:uri="http://purl.org/dc/terms/"/>
-    <ds:schemaRef ds:uri="http://www.w3.org/XML/1998/namespace"/>
-    <ds:schemaRef ds:uri="http://schemas.microsoft.com/office/infopath/2007/PartnerControls"/>
     <ds:schemaRef ds:uri="http://schemas.openxmlformats.org/package/2006/metadata/core-properties"/>
-    <ds:schemaRef ds:uri="e06ed288-fd75-4b50-bbed-f5a5df88c31c"/>
-    <ds:schemaRef ds:uri="http://purl.org/dc/elements/1.1/"/>
   </ds:schemaRefs>
 </ds:datastoreItem>
 </file>
</xml_diff>